<commit_message>
completed half of talk
</commit_message>
<xml_diff>
--- a/Talks/6_28_17/DensityBasedClustering.pptx
+++ b/Talks/6_28_17/DensityBasedClustering.pptx
@@ -11,6 +11,12 @@
     <p:sldId id="260" r:id="rId5"/>
     <p:sldId id="261" r:id="rId6"/>
     <p:sldId id="258" r:id="rId7"/>
+    <p:sldId id="262" r:id="rId8"/>
+    <p:sldId id="263" r:id="rId9"/>
+    <p:sldId id="264" r:id="rId10"/>
+    <p:sldId id="265" r:id="rId11"/>
+    <p:sldId id="266" r:id="rId12"/>
+    <p:sldId id="267" r:id="rId13"/>
   </p:sldIdLst>
   <p:sldSz cx="12192000" cy="6858000"/>
   <p:notesSz cx="6858000" cy="9144000"/>
@@ -109,7 +115,16 @@
       </a:defRPr>
     </a:lvl9pPr>
   </p:defaultTextStyle>
+  <p:extLst>
+    <p:ext uri="{EFAFB233-063F-42B5-8137-9DF3F51BA10A}">
+      <p15:sldGuideLst xmlns:p15="http://schemas.microsoft.com/office/powerpoint/2012/main"/>
+    </p:ext>
+  </p:extLst>
 </p:presentation>
+</file>
+
+<file path=ppt/revisionInfo.xml><?xml version="1.0" encoding="utf-8"?>
+<p1510:revInfo xmlns:a="http://schemas.openxmlformats.org/drawingml/2006/main" xmlns:r="http://schemas.openxmlformats.org/officeDocument/2006/relationships" xmlns:p1510="http://schemas.microsoft.com/office/powerpoint/2015/10/main"/>
 </file>
 
 <file path=ppt/slideLayouts/slideLayout1.xml><?xml version="1.0" encoding="utf-8"?>
@@ -304,7 +319,7 @@
             <a:fld id="{B61BEF0D-F0BB-DE4B-95CE-6DB70DBA9567}" type="datetimeFigureOut">
               <a:rPr lang="en-US" dirty="0"/>
               <a:pPr/>
-              <a:t>6/25/2017</a:t>
+              <a:t>6/27/2017</a:t>
             </a:fld>
             <a:endParaRPr lang="en-US" dirty="0"/>
           </a:p>
@@ -737,7 +752,7 @@
             <a:fld id="{B61BEF0D-F0BB-DE4B-95CE-6DB70DBA9567}" type="datetimeFigureOut">
               <a:rPr lang="en-US" dirty="0"/>
               <a:pPr/>
-              <a:t>6/25/2017</a:t>
+              <a:t>6/27/2017</a:t>
             </a:fld>
             <a:endParaRPr lang="en-US" dirty="0"/>
           </a:p>
@@ -984,7 +999,7 @@
             <a:fld id="{B61BEF0D-F0BB-DE4B-95CE-6DB70DBA9567}" type="datetimeFigureOut">
               <a:rPr lang="en-US" dirty="0"/>
               <a:pPr/>
-              <a:t>6/25/2017</a:t>
+              <a:t>6/27/2017</a:t>
             </a:fld>
             <a:endParaRPr lang="en-US" dirty="0"/>
           </a:p>
@@ -1289,7 +1304,7 @@
             <a:fld id="{B61BEF0D-F0BB-DE4B-95CE-6DB70DBA9567}" type="datetimeFigureOut">
               <a:rPr lang="en-US" dirty="0"/>
               <a:pPr/>
-              <a:t>6/25/2017</a:t>
+              <a:t>6/27/2017</a:t>
             </a:fld>
             <a:endParaRPr lang="en-US" dirty="0"/>
           </a:p>
@@ -1604,7 +1619,7 @@
             <a:fld id="{B61BEF0D-F0BB-DE4B-95CE-6DB70DBA9567}" type="datetimeFigureOut">
               <a:rPr lang="en-US" dirty="0"/>
               <a:pPr/>
-              <a:t>6/25/2017</a:t>
+              <a:t>6/27/2017</a:t>
             </a:fld>
             <a:endParaRPr lang="en-US" dirty="0"/>
           </a:p>
@@ -1903,7 +1918,7 @@
             <a:fld id="{B61BEF0D-F0BB-DE4B-95CE-6DB70DBA9567}" type="datetimeFigureOut">
               <a:rPr lang="en-US" dirty="0"/>
               <a:pPr/>
-              <a:t>6/25/2017</a:t>
+              <a:t>6/27/2017</a:t>
             </a:fld>
             <a:endParaRPr lang="en-US" dirty="0"/>
           </a:p>
@@ -2267,7 +2282,7 @@
             <a:fld id="{B61BEF0D-F0BB-DE4B-95CE-6DB70DBA9567}" type="datetimeFigureOut">
               <a:rPr lang="en-US" dirty="0"/>
               <a:pPr/>
-              <a:t>6/25/2017</a:t>
+              <a:t>6/27/2017</a:t>
             </a:fld>
             <a:endParaRPr lang="en-US" dirty="0"/>
           </a:p>
@@ -2438,7 +2453,7 @@
             <a:fld id="{B61BEF0D-F0BB-DE4B-95CE-6DB70DBA9567}" type="datetimeFigureOut">
               <a:rPr lang="en-US" dirty="0"/>
               <a:pPr/>
-              <a:t>6/25/2017</a:t>
+              <a:t>6/27/2017</a:t>
             </a:fld>
             <a:endParaRPr lang="en-US" dirty="0"/>
           </a:p>
@@ -2615,7 +2630,7 @@
             <a:fld id="{B61BEF0D-F0BB-DE4B-95CE-6DB70DBA9567}" type="datetimeFigureOut">
               <a:rPr lang="en-US" dirty="0"/>
               <a:pPr/>
-              <a:t>6/25/2017</a:t>
+              <a:t>6/27/2017</a:t>
             </a:fld>
             <a:endParaRPr lang="en-US" dirty="0"/>
           </a:p>
@@ -2782,7 +2797,7 @@
             <a:fld id="{B61BEF0D-F0BB-DE4B-95CE-6DB70DBA9567}" type="datetimeFigureOut">
               <a:rPr lang="en-US" dirty="0"/>
               <a:pPr/>
-              <a:t>6/25/2017</a:t>
+              <a:t>6/27/2017</a:t>
             </a:fld>
             <a:endParaRPr lang="en-US" dirty="0"/>
           </a:p>
@@ -3029,7 +3044,7 @@
             <a:fld id="{B61BEF0D-F0BB-DE4B-95CE-6DB70DBA9567}" type="datetimeFigureOut">
               <a:rPr lang="en-US" dirty="0"/>
               <a:pPr/>
-              <a:t>6/25/2017</a:t>
+              <a:t>6/27/2017</a:t>
             </a:fld>
             <a:endParaRPr lang="en-US" dirty="0"/>
           </a:p>
@@ -3262,7 +3277,7 @@
             <a:fld id="{B61BEF0D-F0BB-DE4B-95CE-6DB70DBA9567}" type="datetimeFigureOut">
               <a:rPr lang="en-US" dirty="0"/>
               <a:pPr/>
-              <a:t>6/25/2017</a:t>
+              <a:t>6/27/2017</a:t>
             </a:fld>
             <a:endParaRPr lang="en-US" dirty="0"/>
           </a:p>
@@ -3641,7 +3656,7 @@
             <a:fld id="{B61BEF0D-F0BB-DE4B-95CE-6DB70DBA9567}" type="datetimeFigureOut">
               <a:rPr lang="en-US" dirty="0"/>
               <a:pPr/>
-              <a:t>6/25/2017</a:t>
+              <a:t>6/27/2017</a:t>
             </a:fld>
             <a:endParaRPr lang="en-US" dirty="0"/>
           </a:p>
@@ -3756,7 +3771,7 @@
             <a:fld id="{B61BEF0D-F0BB-DE4B-95CE-6DB70DBA9567}" type="datetimeFigureOut">
               <a:rPr lang="en-US" dirty="0"/>
               <a:pPr/>
-              <a:t>6/25/2017</a:t>
+              <a:t>6/27/2017</a:t>
             </a:fld>
             <a:endParaRPr lang="en-US" dirty="0"/>
           </a:p>
@@ -3848,7 +3863,7 @@
             <a:fld id="{B61BEF0D-F0BB-DE4B-95CE-6DB70DBA9567}" type="datetimeFigureOut">
               <a:rPr lang="en-US" dirty="0"/>
               <a:pPr/>
-              <a:t>6/25/2017</a:t>
+              <a:t>6/27/2017</a:t>
             </a:fld>
             <a:endParaRPr lang="en-US" dirty="0"/>
           </a:p>
@@ -4100,7 +4115,7 @@
             <a:fld id="{B61BEF0D-F0BB-DE4B-95CE-6DB70DBA9567}" type="datetimeFigureOut">
               <a:rPr lang="en-US" dirty="0"/>
               <a:pPr/>
-              <a:t>6/25/2017</a:t>
+              <a:t>6/27/2017</a:t>
             </a:fld>
             <a:endParaRPr lang="en-US" dirty="0"/>
           </a:p>
@@ -4380,7 +4395,7 @@
             <a:fld id="{B61BEF0D-F0BB-DE4B-95CE-6DB70DBA9567}" type="datetimeFigureOut">
               <a:rPr lang="en-US" dirty="0"/>
               <a:pPr/>
-              <a:t>6/25/2017</a:t>
+              <a:t>6/27/2017</a:t>
             </a:fld>
             <a:endParaRPr lang="en-US" dirty="0"/>
           </a:p>
@@ -4783,7 +4798,7 @@
             <a:fld id="{B61BEF0D-F0BB-DE4B-95CE-6DB70DBA9567}" type="datetimeFigureOut">
               <a:rPr lang="en-US" dirty="0"/>
               <a:pPr/>
-              <a:t>6/25/2017</a:t>
+              <a:t>6/27/2017</a:t>
             </a:fld>
             <a:endParaRPr lang="en-US" dirty="0"/>
           </a:p>
@@ -5979,6 +5994,376 @@
 </p:sld>
 </file>
 
+<file path=ppt/slides/slide10.xml><?xml version="1.0" encoding="utf-8"?>
+<p:sld xmlns:a="http://schemas.openxmlformats.org/drawingml/2006/main" xmlns:r="http://schemas.openxmlformats.org/officeDocument/2006/relationships" xmlns:p="http://schemas.openxmlformats.org/presentationml/2006/main">
+  <p:cSld>
+    <p:spTree>
+      <p:nvGrpSpPr>
+        <p:cNvPr id="1" name=""/>
+        <p:cNvGrpSpPr/>
+        <p:nvPr/>
+      </p:nvGrpSpPr>
+      <p:grpSpPr>
+        <a:xfrm>
+          <a:off x="0" y="0"/>
+          <a:ext cx="0" cy="0"/>
+          <a:chOff x="0" y="0"/>
+          <a:chExt cx="0" cy="0"/>
+        </a:xfrm>
+      </p:grpSpPr>
+      <p:sp>
+        <p:nvSpPr>
+          <p:cNvPr id="2" name="Title 1">
+            <a:extLst>
+              <a:ext uri="{FF2B5EF4-FFF2-40B4-BE49-F238E27FC236}">
+                <a16:creationId xmlns:a16="http://schemas.microsoft.com/office/drawing/2014/main" id="{46AE445B-3214-4798-ADC2-F8781B3497F0}"/>
+              </a:ext>
+            </a:extLst>
+          </p:cNvPr>
+          <p:cNvSpPr>
+            <a:spLocks noGrp="1"/>
+          </p:cNvSpPr>
+          <p:nvPr>
+            <p:ph type="title"/>
+          </p:nvPr>
+        </p:nvSpPr>
+        <p:spPr/>
+        <p:txBody>
+          <a:bodyPr/>
+          <a:lstStyle/>
+          <a:p>
+            <a:r>
+              <a:rPr lang="en-US" dirty="0"/>
+              <a:t>Build cluster hierarchy</a:t>
+            </a:r>
+          </a:p>
+        </p:txBody>
+      </p:sp>
+      <p:sp>
+        <p:nvSpPr>
+          <p:cNvPr id="3" name="Content Placeholder 2">
+            <a:extLst>
+              <a:ext uri="{FF2B5EF4-FFF2-40B4-BE49-F238E27FC236}">
+                <a16:creationId xmlns:a16="http://schemas.microsoft.com/office/drawing/2014/main" id="{81A762B0-743B-42A0-987A-27A68639A392}"/>
+              </a:ext>
+            </a:extLst>
+          </p:cNvPr>
+          <p:cNvSpPr>
+            <a:spLocks noGrp="1"/>
+          </p:cNvSpPr>
+          <p:nvPr>
+            <p:ph idx="1"/>
+          </p:nvPr>
+        </p:nvSpPr>
+        <p:spPr>
+          <a:xfrm>
+            <a:off x="684212" y="685800"/>
+            <a:ext cx="5043728" cy="4179498"/>
+          </a:xfrm>
+        </p:spPr>
+        <p:txBody>
+          <a:bodyPr/>
+          <a:lstStyle/>
+          <a:p>
+            <a:r>
+              <a:rPr lang="en-US" dirty="0"/>
+              <a:t>Given minimum spanning tree, convert tree into hierarchy of connected components</a:t>
+            </a:r>
+          </a:p>
+          <a:p>
+            <a:pPr lvl="1"/>
+            <a:r>
+              <a:rPr lang="en-US" dirty="0"/>
+              <a:t>Sort edges of tree by distance</a:t>
+            </a:r>
+          </a:p>
+          <a:p>
+            <a:pPr lvl="1"/>
+            <a:r>
+              <a:rPr lang="en-US" dirty="0"/>
+              <a:t>Iterate through the edges and create a new merged cluster for each edge</a:t>
+            </a:r>
+          </a:p>
+          <a:p>
+            <a:pPr lvl="1"/>
+            <a:r>
+              <a:rPr lang="en-US" dirty="0"/>
+              <a:t>Identify merging clusters using a disjoint set data structure</a:t>
+            </a:r>
+          </a:p>
+        </p:txBody>
+      </p:sp>
+      <p:pic>
+        <p:nvPicPr>
+          <p:cNvPr id="4" name="Picture 3">
+            <a:extLst>
+              <a:ext uri="{FF2B5EF4-FFF2-40B4-BE49-F238E27FC236}">
+                <a16:creationId xmlns:a16="http://schemas.microsoft.com/office/drawing/2014/main" id="{1E843D89-E6AB-4CA9-82BB-5CF6FEDBAB09}"/>
+              </a:ext>
+            </a:extLst>
+          </p:cNvPr>
+          <p:cNvPicPr>
+            <a:picLocks noChangeAspect="1"/>
+          </p:cNvPicPr>
+          <p:nvPr/>
+        </p:nvPicPr>
+        <p:blipFill>
+          <a:blip r:embed="rId2"/>
+          <a:stretch>
+            <a:fillRect/>
+          </a:stretch>
+        </p:blipFill>
+        <p:spPr>
+          <a:xfrm>
+            <a:off x="5727940" y="685800"/>
+            <a:ext cx="5686425" cy="3971925"/>
+          </a:xfrm>
+          <a:prstGeom prst="rect">
+            <a:avLst/>
+          </a:prstGeom>
+        </p:spPr>
+      </p:pic>
+    </p:spTree>
+    <p:extLst>
+      <p:ext uri="{BB962C8B-B14F-4D97-AF65-F5344CB8AC3E}">
+        <p14:creationId xmlns:p14="http://schemas.microsoft.com/office/powerpoint/2010/main" val="961491004"/>
+      </p:ext>
+    </p:extLst>
+  </p:cSld>
+  <p:clrMapOvr>
+    <a:masterClrMapping/>
+  </p:clrMapOvr>
+</p:sld>
+</file>
+
+<file path=ppt/slides/slide11.xml><?xml version="1.0" encoding="utf-8"?>
+<p:sld xmlns:a="http://schemas.openxmlformats.org/drawingml/2006/main" xmlns:r="http://schemas.openxmlformats.org/officeDocument/2006/relationships" xmlns:p="http://schemas.openxmlformats.org/presentationml/2006/main">
+  <p:cSld>
+    <p:spTree>
+      <p:nvGrpSpPr>
+        <p:cNvPr id="1" name=""/>
+        <p:cNvGrpSpPr/>
+        <p:nvPr/>
+      </p:nvGrpSpPr>
+      <p:grpSpPr>
+        <a:xfrm>
+          <a:off x="0" y="0"/>
+          <a:ext cx="0" cy="0"/>
+          <a:chOff x="0" y="0"/>
+          <a:chExt cx="0" cy="0"/>
+        </a:xfrm>
+      </p:grpSpPr>
+      <p:sp>
+        <p:nvSpPr>
+          <p:cNvPr id="2" name="Title 1">
+            <a:extLst>
+              <a:ext uri="{FF2B5EF4-FFF2-40B4-BE49-F238E27FC236}">
+                <a16:creationId xmlns:a16="http://schemas.microsoft.com/office/drawing/2014/main" id="{1CEEC425-956B-47BB-BB28-0914D17A4998}"/>
+              </a:ext>
+            </a:extLst>
+          </p:cNvPr>
+          <p:cNvSpPr>
+            <a:spLocks noGrp="1"/>
+          </p:cNvSpPr>
+          <p:nvPr>
+            <p:ph type="title"/>
+          </p:nvPr>
+        </p:nvSpPr>
+        <p:spPr/>
+        <p:txBody>
+          <a:bodyPr/>
+          <a:lstStyle/>
+          <a:p>
+            <a:r>
+              <a:rPr lang="en-US" dirty="0"/>
+              <a:t>Condense cluster tree</a:t>
+            </a:r>
+          </a:p>
+        </p:txBody>
+      </p:sp>
+      <p:sp>
+        <p:nvSpPr>
+          <p:cNvPr id="3" name="Content Placeholder 2">
+            <a:extLst>
+              <a:ext uri="{FF2B5EF4-FFF2-40B4-BE49-F238E27FC236}">
+                <a16:creationId xmlns:a16="http://schemas.microsoft.com/office/drawing/2014/main" id="{C1CF016F-8C29-49EB-908B-CECEB7BC2A7D}"/>
+              </a:ext>
+            </a:extLst>
+          </p:cNvPr>
+          <p:cNvSpPr>
+            <a:spLocks noGrp="1"/>
+          </p:cNvSpPr>
+          <p:nvPr>
+            <p:ph idx="1"/>
+          </p:nvPr>
+        </p:nvSpPr>
+        <p:spPr>
+          <a:xfrm>
+            <a:off x="684212" y="478766"/>
+            <a:ext cx="5285267" cy="4369279"/>
+          </a:xfrm>
+        </p:spPr>
+        <p:txBody>
+          <a:bodyPr>
+            <a:normAutofit/>
+          </a:bodyPr>
+          <a:lstStyle/>
+          <a:p>
+            <a:r>
+              <a:rPr lang="en-US" dirty="0"/>
+              <a:t>Condense cluster hierarchy into smaller tree</a:t>
+            </a:r>
+          </a:p>
+          <a:p>
+            <a:r>
+              <a:rPr lang="en-US" dirty="0"/>
+              <a:t>Since we have a minimum cluster size input, we walk through the hierarchy and at each split check if one of the new clusters created has fewer points than the minimum cluster size</a:t>
+            </a:r>
+          </a:p>
+          <a:p>
+            <a:r>
+              <a:rPr lang="en-US" dirty="0"/>
+              <a:t>If after splitting we have at least the required number of points for each cluster, then we consider this a “true” split and let that persist in the tree</a:t>
+            </a:r>
+          </a:p>
+          <a:p>
+            <a:r>
+              <a:rPr lang="en-US" dirty="0"/>
+              <a:t>Otherwise we remove it from the tree</a:t>
+            </a:r>
+          </a:p>
+        </p:txBody>
+      </p:sp>
+      <p:pic>
+        <p:nvPicPr>
+          <p:cNvPr id="4" name="Picture 3">
+            <a:extLst>
+              <a:ext uri="{FF2B5EF4-FFF2-40B4-BE49-F238E27FC236}">
+                <a16:creationId xmlns:a16="http://schemas.microsoft.com/office/drawing/2014/main" id="{7EB237D4-3958-41A8-8E97-74D7FBF067D7}"/>
+              </a:ext>
+            </a:extLst>
+          </p:cNvPr>
+          <p:cNvPicPr>
+            <a:picLocks noChangeAspect="1"/>
+          </p:cNvPicPr>
+          <p:nvPr/>
+        </p:nvPicPr>
+        <p:blipFill>
+          <a:blip r:embed="rId2"/>
+          <a:stretch>
+            <a:fillRect/>
+          </a:stretch>
+        </p:blipFill>
+        <p:spPr>
+          <a:xfrm>
+            <a:off x="6400800" y="766025"/>
+            <a:ext cx="5369942" cy="3794759"/>
+          </a:xfrm>
+          <a:prstGeom prst="rect">
+            <a:avLst/>
+          </a:prstGeom>
+        </p:spPr>
+      </p:pic>
+    </p:spTree>
+    <p:extLst>
+      <p:ext uri="{BB962C8B-B14F-4D97-AF65-F5344CB8AC3E}">
+        <p14:creationId xmlns:p14="http://schemas.microsoft.com/office/powerpoint/2010/main" val="3302338237"/>
+      </p:ext>
+    </p:extLst>
+  </p:cSld>
+  <p:clrMapOvr>
+    <a:masterClrMapping/>
+  </p:clrMapOvr>
+</p:sld>
+</file>
+
+<file path=ppt/slides/slide12.xml><?xml version="1.0" encoding="utf-8"?>
+<p:sld xmlns:a="http://schemas.openxmlformats.org/drawingml/2006/main" xmlns:r="http://schemas.openxmlformats.org/officeDocument/2006/relationships" xmlns:p="http://schemas.openxmlformats.org/presentationml/2006/main">
+  <p:cSld>
+    <p:spTree>
+      <p:nvGrpSpPr>
+        <p:cNvPr id="1" name=""/>
+        <p:cNvGrpSpPr/>
+        <p:nvPr/>
+      </p:nvGrpSpPr>
+      <p:grpSpPr>
+        <a:xfrm>
+          <a:off x="0" y="0"/>
+          <a:ext cx="0" cy="0"/>
+          <a:chOff x="0" y="0"/>
+          <a:chExt cx="0" cy="0"/>
+        </a:xfrm>
+      </p:grpSpPr>
+      <p:sp>
+        <p:nvSpPr>
+          <p:cNvPr id="2" name="Title 1">
+            <a:extLst>
+              <a:ext uri="{FF2B5EF4-FFF2-40B4-BE49-F238E27FC236}">
+                <a16:creationId xmlns:a16="http://schemas.microsoft.com/office/drawing/2014/main" id="{CF71916F-FB93-413F-9A31-7267D7C4E169}"/>
+              </a:ext>
+            </a:extLst>
+          </p:cNvPr>
+          <p:cNvSpPr>
+            <a:spLocks noGrp="1"/>
+          </p:cNvSpPr>
+          <p:nvPr>
+            <p:ph type="title"/>
+          </p:nvPr>
+        </p:nvSpPr>
+        <p:spPr/>
+        <p:txBody>
+          <a:bodyPr/>
+          <a:lstStyle/>
+          <a:p>
+            <a:r>
+              <a:rPr lang="en-US" dirty="0"/>
+              <a:t>Extract </a:t>
+            </a:r>
+            <a:r>
+              <a:rPr lang="en-US"/>
+              <a:t>the clusters</a:t>
+            </a:r>
+          </a:p>
+        </p:txBody>
+      </p:sp>
+      <p:sp>
+        <p:nvSpPr>
+          <p:cNvPr id="3" name="Content Placeholder 2">
+            <a:extLst>
+              <a:ext uri="{FF2B5EF4-FFF2-40B4-BE49-F238E27FC236}">
+                <a16:creationId xmlns:a16="http://schemas.microsoft.com/office/drawing/2014/main" id="{37769C0A-6499-4BAF-A9C2-873A168853D0}"/>
+              </a:ext>
+            </a:extLst>
+          </p:cNvPr>
+          <p:cNvSpPr>
+            <a:spLocks noGrp="1"/>
+          </p:cNvSpPr>
+          <p:nvPr>
+            <p:ph idx="1"/>
+          </p:nvPr>
+        </p:nvSpPr>
+        <p:spPr/>
+        <p:txBody>
+          <a:bodyPr/>
+          <a:lstStyle/>
+          <a:p>
+            <a:endParaRPr lang="en-US"/>
+          </a:p>
+        </p:txBody>
+      </p:sp>
+    </p:spTree>
+    <p:extLst>
+      <p:ext uri="{BB962C8B-B14F-4D97-AF65-F5344CB8AC3E}">
+        <p14:creationId xmlns:p14="http://schemas.microsoft.com/office/powerpoint/2010/main" val="4252574023"/>
+      </p:ext>
+    </p:extLst>
+  </p:cSld>
+  <p:clrMapOvr>
+    <a:masterClrMapping/>
+  </p:clrMapOvr>
+</p:sld>
+</file>
+
 <file path=ppt/slides/slide2.xml><?xml version="1.0" encoding="utf-8"?>
 <p:sld xmlns:a="http://schemas.openxmlformats.org/drawingml/2006/main" xmlns:r="http://schemas.openxmlformats.org/officeDocument/2006/relationships" xmlns:p="http://schemas.openxmlformats.org/presentationml/2006/main">
   <p:cSld>
@@ -6673,15 +7058,7 @@
             </a:br>
             <a:r>
               <a:rPr lang="en-US" sz="1400" dirty="0"/>
-              <a:t>Density-based </a:t>
-            </a:r>
-            <a:r>
-              <a:rPr lang="en-US" sz="1400" dirty="0" err="1"/>
-              <a:t>sPatial</a:t>
-            </a:r>
-            <a:r>
-              <a:rPr lang="en-US" sz="1400" dirty="0"/>
-              <a:t> Clustering of applications with noise</a:t>
+              <a:t>Density-based spatial Clustering of applications with noise</a:t>
             </a:r>
             <a:br>
               <a:rPr lang="en-US" sz="1200" dirty="0"/>
@@ -7034,6 +7411,684 @@
     <p:extLst>
       <p:ext uri="{BB962C8B-B14F-4D97-AF65-F5344CB8AC3E}">
         <p14:creationId xmlns:p14="http://schemas.microsoft.com/office/powerpoint/2010/main" val="1683435893"/>
+      </p:ext>
+    </p:extLst>
+  </p:cSld>
+  <p:clrMapOvr>
+    <a:masterClrMapping/>
+  </p:clrMapOvr>
+</p:sld>
+</file>
+
+<file path=ppt/slides/slide7.xml><?xml version="1.0" encoding="utf-8"?>
+<p:sld xmlns:a="http://schemas.openxmlformats.org/drawingml/2006/main" xmlns:r="http://schemas.openxmlformats.org/officeDocument/2006/relationships" xmlns:p="http://schemas.openxmlformats.org/presentationml/2006/main">
+  <p:cSld>
+    <p:spTree>
+      <p:nvGrpSpPr>
+        <p:cNvPr id="1" name=""/>
+        <p:cNvGrpSpPr/>
+        <p:nvPr/>
+      </p:nvGrpSpPr>
+      <p:grpSpPr>
+        <a:xfrm>
+          <a:off x="0" y="0"/>
+          <a:ext cx="0" cy="0"/>
+          <a:chOff x="0" y="0"/>
+          <a:chExt cx="0" cy="0"/>
+        </a:xfrm>
+      </p:grpSpPr>
+      <p:sp>
+        <p:nvSpPr>
+          <p:cNvPr id="2" name="Title 1">
+            <a:extLst>
+              <a:ext uri="{FF2B5EF4-FFF2-40B4-BE49-F238E27FC236}">
+                <a16:creationId xmlns:a16="http://schemas.microsoft.com/office/drawing/2014/main" id="{5FC859E0-8942-4C81-B5E2-2E2F4E873D1D}"/>
+              </a:ext>
+            </a:extLst>
+          </p:cNvPr>
+          <p:cNvSpPr>
+            <a:spLocks noGrp="1"/>
+          </p:cNvSpPr>
+          <p:nvPr>
+            <p:ph type="title"/>
+          </p:nvPr>
+        </p:nvSpPr>
+        <p:spPr/>
+        <p:txBody>
+          <a:bodyPr>
+            <a:normAutofit/>
+          </a:bodyPr>
+          <a:lstStyle/>
+          <a:p>
+            <a:r>
+              <a:rPr lang="en-US" dirty="0"/>
+              <a:t>HDBSCAN</a:t>
+            </a:r>
+            <a:br>
+              <a:rPr lang="en-US" dirty="0"/>
+            </a:br>
+            <a:r>
+              <a:rPr lang="en-US" sz="1400" dirty="0"/>
+              <a:t>hierarchical density-based spatial Clustering of applications with noise</a:t>
+            </a:r>
+            <a:br>
+              <a:rPr lang="en-US" sz="3200" dirty="0"/>
+            </a:br>
+            <a:r>
+              <a:rPr lang="en-US" sz="1000" dirty="0"/>
+              <a:t>(</a:t>
+            </a:r>
+            <a:r>
+              <a:rPr lang="en-US" sz="1000" dirty="0" err="1"/>
+              <a:t>Campello</a:t>
+            </a:r>
+            <a:r>
+              <a:rPr lang="en-US" sz="1000" dirty="0"/>
+              <a:t> et al. 2015)</a:t>
+            </a:r>
+            <a:endParaRPr lang="en-US" dirty="0"/>
+          </a:p>
+        </p:txBody>
+      </p:sp>
+      <p:sp>
+        <p:nvSpPr>
+          <p:cNvPr id="3" name="Content Placeholder 2">
+            <a:extLst>
+              <a:ext uri="{FF2B5EF4-FFF2-40B4-BE49-F238E27FC236}">
+                <a16:creationId xmlns:a16="http://schemas.microsoft.com/office/drawing/2014/main" id="{CB28C8FA-14E4-47B7-8132-FFA94F9A095D}"/>
+              </a:ext>
+            </a:extLst>
+          </p:cNvPr>
+          <p:cNvSpPr>
+            <a:spLocks noGrp="1"/>
+          </p:cNvSpPr>
+          <p:nvPr>
+            <p:ph idx="1"/>
+          </p:nvPr>
+        </p:nvSpPr>
+        <p:spPr>
+          <a:xfrm>
+            <a:off x="684212" y="685800"/>
+            <a:ext cx="9615728" cy="4006970"/>
+          </a:xfrm>
+        </p:spPr>
+        <p:txBody>
+          <a:bodyPr/>
+          <a:lstStyle/>
+          <a:p>
+            <a:r>
+              <a:rPr lang="en-US" dirty="0">
+                <a:solidFill>
+                  <a:schemeClr val="tx1"/>
+                </a:solidFill>
+              </a:rPr>
+              <a:t>Extends DBSCAN by converting it into a hierarchical clustering algorithm</a:t>
+            </a:r>
+          </a:p>
+          <a:p>
+            <a:r>
+              <a:rPr lang="en-US" dirty="0">
+                <a:solidFill>
+                  <a:schemeClr val="tx1"/>
+                </a:solidFill>
+              </a:rPr>
+              <a:t>Only 1 parameter: minimum cluster size</a:t>
+            </a:r>
+          </a:p>
+          <a:p>
+            <a:r>
+              <a:rPr lang="en-US" dirty="0">
+                <a:solidFill>
+                  <a:schemeClr val="tx1"/>
+                </a:solidFill>
+              </a:rPr>
+              <a:t>Steps</a:t>
+            </a:r>
+          </a:p>
+          <a:p>
+            <a:pPr lvl="1"/>
+            <a:r>
+              <a:rPr lang="en-US" dirty="0">
+                <a:solidFill>
+                  <a:schemeClr val="tx1"/>
+                </a:solidFill>
+              </a:rPr>
+              <a:t>Transform space according to the density/sparsity</a:t>
+            </a:r>
+          </a:p>
+          <a:p>
+            <a:pPr lvl="1"/>
+            <a:r>
+              <a:rPr lang="en-US" dirty="0">
+                <a:solidFill>
+                  <a:schemeClr val="tx1"/>
+                </a:solidFill>
+              </a:rPr>
+              <a:t>Build the minimum spanning tree of the distance weighted graph</a:t>
+            </a:r>
+          </a:p>
+          <a:p>
+            <a:pPr lvl="1"/>
+            <a:r>
+              <a:rPr lang="en-US" dirty="0">
+                <a:solidFill>
+                  <a:schemeClr val="tx1"/>
+                </a:solidFill>
+              </a:rPr>
+              <a:t>Construct a cluster hierarchy of connected components</a:t>
+            </a:r>
+          </a:p>
+          <a:p>
+            <a:pPr lvl="1"/>
+            <a:r>
+              <a:rPr lang="en-US" dirty="0">
+                <a:solidFill>
+                  <a:schemeClr val="tx1"/>
+                </a:solidFill>
+              </a:rPr>
+              <a:t>Condense the cluster hierarchy based on minimum cluster size</a:t>
+            </a:r>
+          </a:p>
+          <a:p>
+            <a:pPr lvl="1"/>
+            <a:r>
+              <a:rPr lang="en-US" dirty="0">
+                <a:solidFill>
+                  <a:schemeClr val="tx1"/>
+                </a:solidFill>
+              </a:rPr>
+              <a:t>Extract the stable clusters from the condensed tree</a:t>
+            </a:r>
+          </a:p>
+        </p:txBody>
+      </p:sp>
+    </p:spTree>
+    <p:extLst>
+      <p:ext uri="{BB962C8B-B14F-4D97-AF65-F5344CB8AC3E}">
+        <p14:creationId xmlns:p14="http://schemas.microsoft.com/office/powerpoint/2010/main" val="1218009909"/>
+      </p:ext>
+    </p:extLst>
+  </p:cSld>
+  <p:clrMapOvr>
+    <a:masterClrMapping/>
+  </p:clrMapOvr>
+</p:sld>
+</file>
+
+<file path=ppt/slides/slide8.xml><?xml version="1.0" encoding="utf-8"?>
+<p:sld xmlns:a="http://schemas.openxmlformats.org/drawingml/2006/main" xmlns:r="http://schemas.openxmlformats.org/officeDocument/2006/relationships" xmlns:p="http://schemas.openxmlformats.org/presentationml/2006/main">
+  <p:cSld>
+    <p:spTree>
+      <p:nvGrpSpPr>
+        <p:cNvPr id="1" name=""/>
+        <p:cNvGrpSpPr/>
+        <p:nvPr/>
+      </p:nvGrpSpPr>
+      <p:grpSpPr>
+        <a:xfrm>
+          <a:off x="0" y="0"/>
+          <a:ext cx="0" cy="0"/>
+          <a:chOff x="0" y="0"/>
+          <a:chExt cx="0" cy="0"/>
+        </a:xfrm>
+      </p:grpSpPr>
+      <p:sp>
+        <p:nvSpPr>
+          <p:cNvPr id="2" name="Title 1">
+            <a:extLst>
+              <a:ext uri="{FF2B5EF4-FFF2-40B4-BE49-F238E27FC236}">
+                <a16:creationId xmlns:a16="http://schemas.microsoft.com/office/drawing/2014/main" id="{61CAEFC2-43B2-44FA-B92E-7C699E583619}"/>
+              </a:ext>
+            </a:extLst>
+          </p:cNvPr>
+          <p:cNvSpPr>
+            <a:spLocks noGrp="1"/>
+          </p:cNvSpPr>
+          <p:nvPr>
+            <p:ph type="title"/>
+          </p:nvPr>
+        </p:nvSpPr>
+        <p:spPr>
+          <a:xfrm>
+            <a:off x="684212" y="4487332"/>
+            <a:ext cx="8534400" cy="1507067"/>
+          </a:xfrm>
+        </p:spPr>
+        <p:txBody>
+          <a:bodyPr/>
+          <a:lstStyle/>
+          <a:p>
+            <a:r>
+              <a:rPr lang="en-US"/>
+              <a:t>Step 1: transom the space</a:t>
+            </a:r>
+            <a:endParaRPr lang="en-US" dirty="0"/>
+          </a:p>
+        </p:txBody>
+      </p:sp>
+      <p:sp>
+        <p:nvSpPr>
+          <p:cNvPr id="3" name="Content Placeholder 2">
+            <a:extLst>
+              <a:ext uri="{FF2B5EF4-FFF2-40B4-BE49-F238E27FC236}">
+                <a16:creationId xmlns:a16="http://schemas.microsoft.com/office/drawing/2014/main" id="{6B360F33-69FC-4C07-8B1B-B9EA531DB022}"/>
+              </a:ext>
+            </a:extLst>
+          </p:cNvPr>
+          <p:cNvSpPr>
+            <a:spLocks noGrp="1"/>
+          </p:cNvSpPr>
+          <p:nvPr>
+            <p:ph idx="1"/>
+          </p:nvPr>
+        </p:nvSpPr>
+        <p:spPr>
+          <a:xfrm>
+            <a:off x="684212" y="685800"/>
+            <a:ext cx="8118966" cy="4214004"/>
+          </a:xfrm>
+        </p:spPr>
+        <p:txBody>
+          <a:bodyPr>
+            <a:normAutofit/>
+          </a:bodyPr>
+          <a:lstStyle/>
+          <a:p>
+            <a:r>
+              <a:rPr lang="en-US" dirty="0">
+                <a:solidFill>
+                  <a:schemeClr val="tx1"/>
+                </a:solidFill>
+              </a:rPr>
+              <a:t>Identify low density (sea) and high density (land) points</a:t>
+            </a:r>
+          </a:p>
+          <a:p>
+            <a:r>
+              <a:rPr lang="en-US" dirty="0">
+                <a:solidFill>
+                  <a:schemeClr val="tx1"/>
+                </a:solidFill>
+              </a:rPr>
+              <a:t>Lower the sea level by making sea points more distant from each other and land points</a:t>
+            </a:r>
+          </a:p>
+          <a:p>
+            <a:r>
+              <a:rPr lang="en-US" dirty="0">
+                <a:solidFill>
+                  <a:schemeClr val="tx1"/>
+                </a:solidFill>
+              </a:rPr>
+              <a:t>Estimate density by calculating </a:t>
+            </a:r>
+            <a:r>
+              <a:rPr lang="en-US" b="1" dirty="0">
+                <a:solidFill>
+                  <a:schemeClr val="tx1"/>
+                </a:solidFill>
+              </a:rPr>
+              <a:t>core distance </a:t>
+            </a:r>
+            <a:r>
+              <a:rPr lang="en-US" dirty="0">
+                <a:solidFill>
+                  <a:schemeClr val="tx1"/>
+                </a:solidFill>
+              </a:rPr>
+              <a:t>of points and </a:t>
+            </a:r>
+            <a:r>
+              <a:rPr lang="en-US" b="1" dirty="0">
+                <a:solidFill>
+                  <a:schemeClr val="tx1"/>
+                </a:solidFill>
+              </a:rPr>
+              <a:t>mutual reachability distance (MRD) </a:t>
+            </a:r>
+            <a:r>
+              <a:rPr lang="en-US" dirty="0">
+                <a:solidFill>
+                  <a:schemeClr val="tx1"/>
+                </a:solidFill>
+              </a:rPr>
+              <a:t>between points</a:t>
+            </a:r>
+          </a:p>
+          <a:p>
+            <a:pPr lvl="1"/>
+            <a:r>
+              <a:rPr lang="en-US" b="1" dirty="0">
+                <a:solidFill>
+                  <a:schemeClr val="tx1"/>
+                </a:solidFill>
+              </a:rPr>
+              <a:t>Core distance: </a:t>
+            </a:r>
+            <a:r>
+              <a:rPr lang="en-US" dirty="0">
+                <a:solidFill>
+                  <a:schemeClr val="tx1"/>
+                </a:solidFill>
+              </a:rPr>
+              <a:t>distance to the kth nearest neighbor</a:t>
+            </a:r>
+          </a:p>
+          <a:p>
+            <a:pPr lvl="1"/>
+            <a:r>
+              <a:rPr lang="en-US" b="1" dirty="0">
+                <a:solidFill>
+                  <a:schemeClr val="tx1"/>
+                </a:solidFill>
+              </a:rPr>
+              <a:t>MRD: </a:t>
+            </a:r>
+          </a:p>
+          <a:p>
+            <a:r>
+              <a:rPr lang="en-US" dirty="0">
+                <a:solidFill>
+                  <a:schemeClr val="tx1"/>
+                </a:solidFill>
+              </a:rPr>
+              <a:t>Thus dense points (low core distance) remain the same distance from each other; sparser points are pushed away to at least their core distance away from any other point (lowers sea level)</a:t>
+            </a:r>
+          </a:p>
+        </p:txBody>
+      </p:sp>
+      <p:pic>
+        <p:nvPicPr>
+          <p:cNvPr id="4" name="Picture 3">
+            <a:extLst>
+              <a:ext uri="{FF2B5EF4-FFF2-40B4-BE49-F238E27FC236}">
+                <a16:creationId xmlns:a16="http://schemas.microsoft.com/office/drawing/2014/main" id="{05D8EE72-6AB4-48DE-BFF2-A522FBB001D6}"/>
+              </a:ext>
+            </a:extLst>
+          </p:cNvPr>
+          <p:cNvPicPr>
+            <a:picLocks noChangeAspect="1"/>
+          </p:cNvPicPr>
+          <p:nvPr/>
+        </p:nvPicPr>
+        <p:blipFill rotWithShape="1">
+          <a:blip r:embed="rId2"/>
+          <a:srcRect l="1699" t="13649" r="1594" b="13604"/>
+          <a:stretch/>
+        </p:blipFill>
+        <p:spPr>
+          <a:xfrm>
+            <a:off x="2152996" y="3133744"/>
+            <a:ext cx="5459054" cy="324196"/>
+          </a:xfrm>
+          <a:prstGeom prst="rect">
+            <a:avLst/>
+          </a:prstGeom>
+        </p:spPr>
+      </p:pic>
+      <p:sp>
+        <p:nvSpPr>
+          <p:cNvPr id="6" name="AutoShape 2" descr="Diagram demonstrating mutual reachability distance">
+            <a:extLst>
+              <a:ext uri="{FF2B5EF4-FFF2-40B4-BE49-F238E27FC236}">
+                <a16:creationId xmlns:a16="http://schemas.microsoft.com/office/drawing/2014/main" id="{5C7E8D0B-D02E-44EF-8AEA-E5BC43732EB8}"/>
+              </a:ext>
+            </a:extLst>
+          </p:cNvPr>
+          <p:cNvSpPr>
+            <a:spLocks noChangeAspect="1" noChangeArrowheads="1"/>
+          </p:cNvSpPr>
+          <p:nvPr/>
+        </p:nvSpPr>
+        <p:spPr bwMode="auto">
+          <a:xfrm>
+            <a:off x="5943600" y="3276600"/>
+            <a:ext cx="304800" cy="304800"/>
+          </a:xfrm>
+          <a:prstGeom prst="rect">
+            <a:avLst/>
+          </a:prstGeom>
+          <a:noFill/>
+          <a:extLst>
+            <a:ext uri="{909E8E84-426E-40DD-AFC4-6F175D3DCCD1}">
+              <a14:hiddenFill xmlns:a14="http://schemas.microsoft.com/office/drawing/2010/main">
+                <a:solidFill>
+                  <a:srgbClr val="FFFFFF"/>
+                </a:solidFill>
+              </a14:hiddenFill>
+            </a:ext>
+          </a:extLst>
+        </p:spPr>
+        <p:txBody>
+          <a:bodyPr vert="horz" wrap="square" lIns="91440" tIns="45720" rIns="91440" bIns="45720" numCol="1" anchor="t" anchorCtr="0" compatLnSpc="1">
+            <a:prstTxWarp prst="textNoShape">
+              <a:avLst/>
+            </a:prstTxWarp>
+          </a:bodyPr>
+          <a:lstStyle/>
+          <a:p>
+            <a:endParaRPr lang="en-US"/>
+          </a:p>
+        </p:txBody>
+      </p:sp>
+      <p:pic>
+        <p:nvPicPr>
+          <p:cNvPr id="8" name="Picture 7">
+            <a:extLst>
+              <a:ext uri="{FF2B5EF4-FFF2-40B4-BE49-F238E27FC236}">
+                <a16:creationId xmlns:a16="http://schemas.microsoft.com/office/drawing/2014/main" id="{887B1759-EB22-421C-92CA-6D93BC91405B}"/>
+              </a:ext>
+            </a:extLst>
+          </p:cNvPr>
+          <p:cNvPicPr>
+            <a:picLocks noChangeAspect="1"/>
+          </p:cNvPicPr>
+          <p:nvPr/>
+        </p:nvPicPr>
+        <p:blipFill rotWithShape="1">
+          <a:blip r:embed="rId3"/>
+          <a:srcRect l="11058" t="11893" r="18254" b="13826"/>
+          <a:stretch/>
+        </p:blipFill>
+        <p:spPr>
+          <a:xfrm>
+            <a:off x="8911243" y="284584"/>
+            <a:ext cx="2676495" cy="1946231"/>
+          </a:xfrm>
+          <a:prstGeom prst="rect">
+            <a:avLst/>
+          </a:prstGeom>
+        </p:spPr>
+      </p:pic>
+      <p:pic>
+        <p:nvPicPr>
+          <p:cNvPr id="9" name="Picture 8">
+            <a:extLst>
+              <a:ext uri="{FF2B5EF4-FFF2-40B4-BE49-F238E27FC236}">
+                <a16:creationId xmlns:a16="http://schemas.microsoft.com/office/drawing/2014/main" id="{CF34DF53-BF34-47CC-B201-AAD9575CF9B5}"/>
+              </a:ext>
+            </a:extLst>
+          </p:cNvPr>
+          <p:cNvPicPr>
+            <a:picLocks noChangeAspect="1"/>
+          </p:cNvPicPr>
+          <p:nvPr/>
+        </p:nvPicPr>
+        <p:blipFill rotWithShape="1">
+          <a:blip r:embed="rId4"/>
+          <a:srcRect l="10617" t="12930" r="18076" b="15419"/>
+          <a:stretch/>
+        </p:blipFill>
+        <p:spPr>
+          <a:xfrm>
+            <a:off x="8911243" y="2494574"/>
+            <a:ext cx="2676495" cy="1868851"/>
+          </a:xfrm>
+          <a:prstGeom prst="rect">
+            <a:avLst/>
+          </a:prstGeom>
+        </p:spPr>
+      </p:pic>
+      <p:pic>
+        <p:nvPicPr>
+          <p:cNvPr id="11" name="Picture 10">
+            <a:extLst>
+              <a:ext uri="{FF2B5EF4-FFF2-40B4-BE49-F238E27FC236}">
+                <a16:creationId xmlns:a16="http://schemas.microsoft.com/office/drawing/2014/main" id="{94311CF5-0AFC-42B1-AC40-D13CF96A1E24}"/>
+              </a:ext>
+            </a:extLst>
+          </p:cNvPr>
+          <p:cNvPicPr>
+            <a:picLocks noChangeAspect="1"/>
+          </p:cNvPicPr>
+          <p:nvPr/>
+        </p:nvPicPr>
+        <p:blipFill rotWithShape="1">
+          <a:blip r:embed="rId5"/>
+          <a:srcRect l="12384" t="13967" r="18833" b="17254"/>
+          <a:stretch/>
+        </p:blipFill>
+        <p:spPr>
+          <a:xfrm>
+            <a:off x="8911244" y="4627184"/>
+            <a:ext cx="2679065" cy="1889994"/>
+          </a:xfrm>
+          <a:prstGeom prst="rect">
+            <a:avLst/>
+          </a:prstGeom>
+        </p:spPr>
+      </p:pic>
+    </p:spTree>
+    <p:extLst>
+      <p:ext uri="{BB962C8B-B14F-4D97-AF65-F5344CB8AC3E}">
+        <p14:creationId xmlns:p14="http://schemas.microsoft.com/office/powerpoint/2010/main" val="3318452237"/>
+      </p:ext>
+    </p:extLst>
+  </p:cSld>
+  <p:clrMapOvr>
+    <a:masterClrMapping/>
+  </p:clrMapOvr>
+</p:sld>
+</file>
+
+<file path=ppt/slides/slide9.xml><?xml version="1.0" encoding="utf-8"?>
+<p:sld xmlns:a="http://schemas.openxmlformats.org/drawingml/2006/main" xmlns:r="http://schemas.openxmlformats.org/officeDocument/2006/relationships" xmlns:p="http://schemas.openxmlformats.org/presentationml/2006/main">
+  <p:cSld>
+    <p:spTree>
+      <p:nvGrpSpPr>
+        <p:cNvPr id="1" name=""/>
+        <p:cNvGrpSpPr/>
+        <p:nvPr/>
+      </p:nvGrpSpPr>
+      <p:grpSpPr>
+        <a:xfrm>
+          <a:off x="0" y="0"/>
+          <a:ext cx="0" cy="0"/>
+          <a:chOff x="0" y="0"/>
+          <a:chExt cx="0" cy="0"/>
+        </a:xfrm>
+      </p:grpSpPr>
+      <p:sp>
+        <p:nvSpPr>
+          <p:cNvPr id="2" name="Title 1">
+            <a:extLst>
+              <a:ext uri="{FF2B5EF4-FFF2-40B4-BE49-F238E27FC236}">
+                <a16:creationId xmlns:a16="http://schemas.microsoft.com/office/drawing/2014/main" id="{CC315FF2-2B1B-443E-95D8-EA3EF889E63C}"/>
+              </a:ext>
+            </a:extLst>
+          </p:cNvPr>
+          <p:cNvSpPr>
+            <a:spLocks noGrp="1"/>
+          </p:cNvSpPr>
+          <p:nvPr>
+            <p:ph type="title"/>
+          </p:nvPr>
+        </p:nvSpPr>
+        <p:spPr/>
+        <p:txBody>
+          <a:bodyPr/>
+          <a:lstStyle/>
+          <a:p>
+            <a:r>
+              <a:rPr lang="en-US" dirty="0"/>
+              <a:t>Build minimum spanning tree</a:t>
+            </a:r>
+          </a:p>
+        </p:txBody>
+      </p:sp>
+      <p:sp>
+        <p:nvSpPr>
+          <p:cNvPr id="3" name="Content Placeholder 2">
+            <a:extLst>
+              <a:ext uri="{FF2B5EF4-FFF2-40B4-BE49-F238E27FC236}">
+                <a16:creationId xmlns:a16="http://schemas.microsoft.com/office/drawing/2014/main" id="{5F1E9502-8C44-4DA6-9D80-F81A2972D2A4}"/>
+              </a:ext>
+            </a:extLst>
+          </p:cNvPr>
+          <p:cNvSpPr>
+            <a:spLocks noGrp="1"/>
+          </p:cNvSpPr>
+          <p:nvPr>
+            <p:ph idx="1"/>
+          </p:nvPr>
+        </p:nvSpPr>
+        <p:spPr>
+          <a:xfrm>
+            <a:off x="684212" y="685800"/>
+            <a:ext cx="5906369" cy="3615267"/>
+          </a:xfrm>
+        </p:spPr>
+        <p:txBody>
+          <a:bodyPr/>
+          <a:lstStyle/>
+          <a:p>
+            <a:r>
+              <a:rPr lang="en-US" dirty="0"/>
+              <a:t>Consider data as a weighted graph with the data points as vertices and MRD as edge weights</a:t>
+            </a:r>
+          </a:p>
+          <a:p>
+            <a:r>
+              <a:rPr lang="en-US" dirty="0"/>
+              <a:t>Find the minimum spanning tree of this graph</a:t>
+            </a:r>
+          </a:p>
+        </p:txBody>
+      </p:sp>
+      <p:pic>
+        <p:nvPicPr>
+          <p:cNvPr id="4" name="Picture 3">
+            <a:extLst>
+              <a:ext uri="{FF2B5EF4-FFF2-40B4-BE49-F238E27FC236}">
+                <a16:creationId xmlns:a16="http://schemas.microsoft.com/office/drawing/2014/main" id="{FF08629E-CAEA-4DFE-8947-D35CEFCCAEA1}"/>
+              </a:ext>
+            </a:extLst>
+          </p:cNvPr>
+          <p:cNvPicPr>
+            <a:picLocks noChangeAspect="1"/>
+          </p:cNvPicPr>
+          <p:nvPr/>
+        </p:nvPicPr>
+        <p:blipFill>
+          <a:blip r:embed="rId2"/>
+          <a:stretch>
+            <a:fillRect/>
+          </a:stretch>
+        </p:blipFill>
+        <p:spPr>
+          <a:xfrm>
+            <a:off x="6590581" y="1001512"/>
+            <a:ext cx="4773883" cy="3485820"/>
+          </a:xfrm>
+          <a:prstGeom prst="rect">
+            <a:avLst/>
+          </a:prstGeom>
+        </p:spPr>
+      </p:pic>
+    </p:spTree>
+    <p:extLst>
+      <p:ext uri="{BB962C8B-B14F-4D97-AF65-F5344CB8AC3E}">
+        <p14:creationId xmlns:p14="http://schemas.microsoft.com/office/powerpoint/2010/main" val="1398896775"/>
       </p:ext>
     </p:extLst>
   </p:cSld>

</xml_diff>

<commit_message>
added MD hdbscan paper to resources
</commit_message>
<xml_diff>
--- a/Talks/6_28_17/DensityBasedClustering.pptx
+++ b/Talks/6_28_17/DensityBasedClustering.pptx
@@ -14,9 +14,12 @@
     <p:sldId id="262" r:id="rId8"/>
     <p:sldId id="263" r:id="rId9"/>
     <p:sldId id="264" r:id="rId10"/>
-    <p:sldId id="265" r:id="rId11"/>
-    <p:sldId id="266" r:id="rId12"/>
-    <p:sldId id="267" r:id="rId13"/>
+    <p:sldId id="270" r:id="rId11"/>
+    <p:sldId id="265" r:id="rId12"/>
+    <p:sldId id="266" r:id="rId13"/>
+    <p:sldId id="267" r:id="rId14"/>
+    <p:sldId id="268" r:id="rId15"/>
+    <p:sldId id="269" r:id="rId16"/>
   </p:sldIdLst>
   <p:sldSz cx="12192000" cy="6858000"/>
   <p:notesSz cx="6858000" cy="9144000"/>
@@ -319,7 +322,7 @@
             <a:fld id="{B61BEF0D-F0BB-DE4B-95CE-6DB70DBA9567}" type="datetimeFigureOut">
               <a:rPr lang="en-US" dirty="0"/>
               <a:pPr/>
-              <a:t>6/27/2017</a:t>
+              <a:t>6/28/2017</a:t>
             </a:fld>
             <a:endParaRPr lang="en-US" dirty="0"/>
           </a:p>
@@ -752,7 +755,7 @@
             <a:fld id="{B61BEF0D-F0BB-DE4B-95CE-6DB70DBA9567}" type="datetimeFigureOut">
               <a:rPr lang="en-US" dirty="0"/>
               <a:pPr/>
-              <a:t>6/27/2017</a:t>
+              <a:t>6/28/2017</a:t>
             </a:fld>
             <a:endParaRPr lang="en-US" dirty="0"/>
           </a:p>
@@ -999,7 +1002,7 @@
             <a:fld id="{B61BEF0D-F0BB-DE4B-95CE-6DB70DBA9567}" type="datetimeFigureOut">
               <a:rPr lang="en-US" dirty="0"/>
               <a:pPr/>
-              <a:t>6/27/2017</a:t>
+              <a:t>6/28/2017</a:t>
             </a:fld>
             <a:endParaRPr lang="en-US" dirty="0"/>
           </a:p>
@@ -1304,7 +1307,7 @@
             <a:fld id="{B61BEF0D-F0BB-DE4B-95CE-6DB70DBA9567}" type="datetimeFigureOut">
               <a:rPr lang="en-US" dirty="0"/>
               <a:pPr/>
-              <a:t>6/27/2017</a:t>
+              <a:t>6/28/2017</a:t>
             </a:fld>
             <a:endParaRPr lang="en-US" dirty="0"/>
           </a:p>
@@ -1619,7 +1622,7 @@
             <a:fld id="{B61BEF0D-F0BB-DE4B-95CE-6DB70DBA9567}" type="datetimeFigureOut">
               <a:rPr lang="en-US" dirty="0"/>
               <a:pPr/>
-              <a:t>6/27/2017</a:t>
+              <a:t>6/28/2017</a:t>
             </a:fld>
             <a:endParaRPr lang="en-US" dirty="0"/>
           </a:p>
@@ -1918,7 +1921,7 @@
             <a:fld id="{B61BEF0D-F0BB-DE4B-95CE-6DB70DBA9567}" type="datetimeFigureOut">
               <a:rPr lang="en-US" dirty="0"/>
               <a:pPr/>
-              <a:t>6/27/2017</a:t>
+              <a:t>6/28/2017</a:t>
             </a:fld>
             <a:endParaRPr lang="en-US" dirty="0"/>
           </a:p>
@@ -2282,7 +2285,7 @@
             <a:fld id="{B61BEF0D-F0BB-DE4B-95CE-6DB70DBA9567}" type="datetimeFigureOut">
               <a:rPr lang="en-US" dirty="0"/>
               <a:pPr/>
-              <a:t>6/27/2017</a:t>
+              <a:t>6/28/2017</a:t>
             </a:fld>
             <a:endParaRPr lang="en-US" dirty="0"/>
           </a:p>
@@ -2453,7 +2456,7 @@
             <a:fld id="{B61BEF0D-F0BB-DE4B-95CE-6DB70DBA9567}" type="datetimeFigureOut">
               <a:rPr lang="en-US" dirty="0"/>
               <a:pPr/>
-              <a:t>6/27/2017</a:t>
+              <a:t>6/28/2017</a:t>
             </a:fld>
             <a:endParaRPr lang="en-US" dirty="0"/>
           </a:p>
@@ -2630,7 +2633,7 @@
             <a:fld id="{B61BEF0D-F0BB-DE4B-95CE-6DB70DBA9567}" type="datetimeFigureOut">
               <a:rPr lang="en-US" dirty="0"/>
               <a:pPr/>
-              <a:t>6/27/2017</a:t>
+              <a:t>6/28/2017</a:t>
             </a:fld>
             <a:endParaRPr lang="en-US" dirty="0"/>
           </a:p>
@@ -2797,7 +2800,7 @@
             <a:fld id="{B61BEF0D-F0BB-DE4B-95CE-6DB70DBA9567}" type="datetimeFigureOut">
               <a:rPr lang="en-US" dirty="0"/>
               <a:pPr/>
-              <a:t>6/27/2017</a:t>
+              <a:t>6/28/2017</a:t>
             </a:fld>
             <a:endParaRPr lang="en-US" dirty="0"/>
           </a:p>
@@ -3044,7 +3047,7 @@
             <a:fld id="{B61BEF0D-F0BB-DE4B-95CE-6DB70DBA9567}" type="datetimeFigureOut">
               <a:rPr lang="en-US" dirty="0"/>
               <a:pPr/>
-              <a:t>6/27/2017</a:t>
+              <a:t>6/28/2017</a:t>
             </a:fld>
             <a:endParaRPr lang="en-US" dirty="0"/>
           </a:p>
@@ -3277,7 +3280,7 @@
             <a:fld id="{B61BEF0D-F0BB-DE4B-95CE-6DB70DBA9567}" type="datetimeFigureOut">
               <a:rPr lang="en-US" dirty="0"/>
               <a:pPr/>
-              <a:t>6/27/2017</a:t>
+              <a:t>6/28/2017</a:t>
             </a:fld>
             <a:endParaRPr lang="en-US" dirty="0"/>
           </a:p>
@@ -3656,7 +3659,7 @@
             <a:fld id="{B61BEF0D-F0BB-DE4B-95CE-6DB70DBA9567}" type="datetimeFigureOut">
               <a:rPr lang="en-US" dirty="0"/>
               <a:pPr/>
-              <a:t>6/27/2017</a:t>
+              <a:t>6/28/2017</a:t>
             </a:fld>
             <a:endParaRPr lang="en-US" dirty="0"/>
           </a:p>
@@ -3771,7 +3774,7 @@
             <a:fld id="{B61BEF0D-F0BB-DE4B-95CE-6DB70DBA9567}" type="datetimeFigureOut">
               <a:rPr lang="en-US" dirty="0"/>
               <a:pPr/>
-              <a:t>6/27/2017</a:t>
+              <a:t>6/28/2017</a:t>
             </a:fld>
             <a:endParaRPr lang="en-US" dirty="0"/>
           </a:p>
@@ -3863,7 +3866,7 @@
             <a:fld id="{B61BEF0D-F0BB-DE4B-95CE-6DB70DBA9567}" type="datetimeFigureOut">
               <a:rPr lang="en-US" dirty="0"/>
               <a:pPr/>
-              <a:t>6/27/2017</a:t>
+              <a:t>6/28/2017</a:t>
             </a:fld>
             <a:endParaRPr lang="en-US" dirty="0"/>
           </a:p>
@@ -4115,7 +4118,7 @@
             <a:fld id="{B61BEF0D-F0BB-DE4B-95CE-6DB70DBA9567}" type="datetimeFigureOut">
               <a:rPr lang="en-US" dirty="0"/>
               <a:pPr/>
-              <a:t>6/27/2017</a:t>
+              <a:t>6/28/2017</a:t>
             </a:fld>
             <a:endParaRPr lang="en-US" dirty="0"/>
           </a:p>
@@ -4395,7 +4398,7 @@
             <a:fld id="{B61BEF0D-F0BB-DE4B-95CE-6DB70DBA9567}" type="datetimeFigureOut">
               <a:rPr lang="en-US" dirty="0"/>
               <a:pPr/>
-              <a:t>6/27/2017</a:t>
+              <a:t>6/28/2017</a:t>
             </a:fld>
             <a:endParaRPr lang="en-US" dirty="0"/>
           </a:p>
@@ -4798,7 +4801,7 @@
             <a:fld id="{B61BEF0D-F0BB-DE4B-95CE-6DB70DBA9567}" type="datetimeFigureOut">
               <a:rPr lang="en-US" dirty="0"/>
               <a:pPr/>
-              <a:t>6/27/2017</a:t>
+              <a:t>6/28/2017</a:t>
             </a:fld>
             <a:endParaRPr lang="en-US" dirty="0"/>
           </a:p>
@@ -5704,7 +5707,9 @@
             <a:r>
               <a:rPr lang="en-US" dirty="0">
                 <a:solidFill>
-                  <a:schemeClr val="bg1"/>
+                  <a:schemeClr val="tx1">
+                    <a:lumMod val="75000"/>
+                  </a:schemeClr>
                 </a:solidFill>
               </a:rPr>
               <a:t>SUBCLU</a:t>
@@ -6016,6 +6021,133 @@
           <p:cNvPr id="2" name="Title 1">
             <a:extLst>
               <a:ext uri="{FF2B5EF4-FFF2-40B4-BE49-F238E27FC236}">
+                <a16:creationId xmlns:a16="http://schemas.microsoft.com/office/drawing/2014/main" id="{9AF70F1B-F580-4822-B07E-A178C3E4D69F}"/>
+              </a:ext>
+            </a:extLst>
+          </p:cNvPr>
+          <p:cNvSpPr>
+            <a:spLocks noGrp="1"/>
+          </p:cNvSpPr>
+          <p:nvPr>
+            <p:ph type="title"/>
+          </p:nvPr>
+        </p:nvSpPr>
+        <p:spPr/>
+        <p:txBody>
+          <a:bodyPr/>
+          <a:lstStyle/>
+          <a:p>
+            <a:endParaRPr lang="en-US"/>
+          </a:p>
+        </p:txBody>
+      </p:sp>
+      <p:sp>
+        <p:nvSpPr>
+          <p:cNvPr id="3" name="Content Placeholder 2">
+            <a:extLst>
+              <a:ext uri="{FF2B5EF4-FFF2-40B4-BE49-F238E27FC236}">
+                <a16:creationId xmlns:a16="http://schemas.microsoft.com/office/drawing/2014/main" id="{AB52121E-9240-4777-8869-89B85CC318F0}"/>
+              </a:ext>
+            </a:extLst>
+          </p:cNvPr>
+          <p:cNvSpPr>
+            <a:spLocks noGrp="1"/>
+          </p:cNvSpPr>
+          <p:nvPr>
+            <p:ph idx="1"/>
+          </p:nvPr>
+        </p:nvSpPr>
+        <p:spPr/>
+        <p:txBody>
+          <a:bodyPr/>
+          <a:lstStyle/>
+          <a:p>
+            <a:endParaRPr lang="en-US"/>
+          </a:p>
+        </p:txBody>
+      </p:sp>
+      <p:pic>
+        <p:nvPicPr>
+          <p:cNvPr id="1026" name="Picture 2" descr="Image may contain: 1 person">
+            <a:extLst>
+              <a:ext uri="{FF2B5EF4-FFF2-40B4-BE49-F238E27FC236}">
+                <a16:creationId xmlns:a16="http://schemas.microsoft.com/office/drawing/2014/main" id="{64151647-C838-4D81-B3D0-CD6C6BFB4DE0}"/>
+              </a:ext>
+            </a:extLst>
+          </p:cNvPr>
+          <p:cNvPicPr>
+            <a:picLocks noChangeAspect="1" noChangeArrowheads="1"/>
+          </p:cNvPicPr>
+          <p:nvPr/>
+        </p:nvPicPr>
+        <p:blipFill>
+          <a:blip r:embed="rId2">
+            <a:extLst>
+              <a:ext uri="{28A0092B-C50C-407E-A947-70E740481C1C}">
+                <a14:useLocalDpi xmlns:a14="http://schemas.microsoft.com/office/drawing/2010/main" val="0"/>
+              </a:ext>
+            </a:extLst>
+          </a:blip>
+          <a:srcRect/>
+          <a:stretch>
+            <a:fillRect/>
+          </a:stretch>
+        </p:blipFill>
+        <p:spPr bwMode="auto">
+          <a:xfrm>
+            <a:off x="3048000" y="381000"/>
+            <a:ext cx="6096000" cy="6096000"/>
+          </a:xfrm>
+          <a:prstGeom prst="rect">
+            <a:avLst/>
+          </a:prstGeom>
+          <a:noFill/>
+          <a:extLst>
+            <a:ext uri="{909E8E84-426E-40DD-AFC4-6F175D3DCCD1}">
+              <a14:hiddenFill xmlns:a14="http://schemas.microsoft.com/office/drawing/2010/main">
+                <a:solidFill>
+                  <a:srgbClr val="FFFFFF"/>
+                </a:solidFill>
+              </a14:hiddenFill>
+            </a:ext>
+          </a:extLst>
+        </p:spPr>
+      </p:pic>
+    </p:spTree>
+    <p:extLst>
+      <p:ext uri="{BB962C8B-B14F-4D97-AF65-F5344CB8AC3E}">
+        <p14:creationId xmlns:p14="http://schemas.microsoft.com/office/powerpoint/2010/main" val="840024408"/>
+      </p:ext>
+    </p:extLst>
+  </p:cSld>
+  <p:clrMapOvr>
+    <a:masterClrMapping/>
+  </p:clrMapOvr>
+</p:sld>
+</file>
+
+<file path=ppt/slides/slide11.xml><?xml version="1.0" encoding="utf-8"?>
+<p:sld xmlns:a="http://schemas.openxmlformats.org/drawingml/2006/main" xmlns:r="http://schemas.openxmlformats.org/officeDocument/2006/relationships" xmlns:p="http://schemas.openxmlformats.org/presentationml/2006/main">
+  <p:cSld>
+    <p:spTree>
+      <p:nvGrpSpPr>
+        <p:cNvPr id="1" name=""/>
+        <p:cNvGrpSpPr/>
+        <p:nvPr/>
+      </p:nvGrpSpPr>
+      <p:grpSpPr>
+        <a:xfrm>
+          <a:off x="0" y="0"/>
+          <a:ext cx="0" cy="0"/>
+          <a:chOff x="0" y="0"/>
+          <a:chExt cx="0" cy="0"/>
+        </a:xfrm>
+      </p:grpSpPr>
+      <p:sp>
+        <p:nvSpPr>
+          <p:cNvPr id="2" name="Title 1">
+            <a:extLst>
+              <a:ext uri="{FF2B5EF4-FFF2-40B4-BE49-F238E27FC236}">
                 <a16:creationId xmlns:a16="http://schemas.microsoft.com/office/drawing/2014/main" id="{46AE445B-3214-4798-ADC2-F8781B3497F0}"/>
               </a:ext>
             </a:extLst>
@@ -6034,7 +6166,7 @@
           <a:p>
             <a:r>
               <a:rPr lang="en-US" dirty="0"/>
-              <a:t>Build cluster hierarchy</a:t>
+              <a:t>Step 3: Build cluster hierarchy</a:t>
             </a:r>
           </a:p>
         </p:txBody>
@@ -6066,28 +6198,44 @@
           <a:lstStyle/>
           <a:p>
             <a:r>
-              <a:rPr lang="en-US" dirty="0"/>
+              <a:rPr lang="en-US" dirty="0">
+                <a:solidFill>
+                  <a:schemeClr val="tx1"/>
+                </a:solidFill>
+              </a:rPr>
               <a:t>Given minimum spanning tree, convert tree into hierarchy of connected components</a:t>
             </a:r>
           </a:p>
           <a:p>
             <a:pPr lvl="1"/>
             <a:r>
-              <a:rPr lang="en-US" dirty="0"/>
+              <a:rPr lang="en-US" dirty="0">
+                <a:solidFill>
+                  <a:schemeClr val="tx1"/>
+                </a:solidFill>
+              </a:rPr>
               <a:t>Sort edges of tree by distance</a:t>
             </a:r>
           </a:p>
           <a:p>
             <a:pPr lvl="1"/>
             <a:r>
-              <a:rPr lang="en-US" dirty="0"/>
+              <a:rPr lang="en-US" dirty="0">
+                <a:solidFill>
+                  <a:schemeClr val="tx1"/>
+                </a:solidFill>
+              </a:rPr>
               <a:t>Iterate through the edges and create a new merged cluster for each edge</a:t>
             </a:r>
           </a:p>
           <a:p>
             <a:pPr lvl="1"/>
             <a:r>
-              <a:rPr lang="en-US" dirty="0"/>
+              <a:rPr lang="en-US" dirty="0">
+                <a:solidFill>
+                  <a:schemeClr val="tx1"/>
+                </a:solidFill>
+              </a:rPr>
               <a:t>Identify merging clusters using a disjoint set data structure</a:t>
             </a:r>
           </a:p>
@@ -6136,7 +6284,7 @@
 </p:sld>
 </file>
 
-<file path=ppt/slides/slide11.xml><?xml version="1.0" encoding="utf-8"?>
+<file path=ppt/slides/slide12.xml><?xml version="1.0" encoding="utf-8"?>
 <p:sld xmlns:a="http://schemas.openxmlformats.org/drawingml/2006/main" xmlns:r="http://schemas.openxmlformats.org/officeDocument/2006/relationships" xmlns:p="http://schemas.openxmlformats.org/presentationml/2006/main">
   <p:cSld>
     <p:spTree>
@@ -6176,7 +6324,7 @@
           <a:p>
             <a:r>
               <a:rPr lang="en-US" dirty="0"/>
-              <a:t>Condense cluster tree</a:t>
+              <a:t>Step 4: Condense cluster tree</a:t>
             </a:r>
           </a:p>
         </p:txBody>
@@ -6199,37 +6347,53 @@
         </p:nvSpPr>
         <p:spPr>
           <a:xfrm>
-            <a:off x="684212" y="478766"/>
-            <a:ext cx="5285267" cy="4369279"/>
+            <a:off x="684212" y="258792"/>
+            <a:ext cx="5285267" cy="4658265"/>
           </a:xfrm>
         </p:spPr>
         <p:txBody>
           <a:bodyPr>
-            <a:normAutofit/>
+            <a:normAutofit lnSpcReduction="10000"/>
           </a:bodyPr>
           <a:lstStyle/>
           <a:p>
             <a:r>
-              <a:rPr lang="en-US" dirty="0"/>
+              <a:rPr lang="en-US" dirty="0">
+                <a:solidFill>
+                  <a:schemeClr val="tx1"/>
+                </a:solidFill>
+              </a:rPr>
               <a:t>Condense cluster hierarchy into smaller tree</a:t>
             </a:r>
           </a:p>
           <a:p>
             <a:r>
-              <a:rPr lang="en-US" dirty="0"/>
+              <a:rPr lang="en-US" dirty="0">
+                <a:solidFill>
+                  <a:schemeClr val="tx1"/>
+                </a:solidFill>
+              </a:rPr>
               <a:t>Since we have a minimum cluster size input, we walk through the hierarchy and at each split check if one of the new clusters created has fewer points than the minimum cluster size</a:t>
             </a:r>
           </a:p>
           <a:p>
             <a:r>
-              <a:rPr lang="en-US" dirty="0"/>
+              <a:rPr lang="en-US" dirty="0">
+                <a:solidFill>
+                  <a:schemeClr val="tx1"/>
+                </a:solidFill>
+              </a:rPr>
               <a:t>If after splitting we have at least the required number of points for each cluster, then we consider this a “true” split and let that persist in the tree</a:t>
             </a:r>
           </a:p>
           <a:p>
             <a:r>
-              <a:rPr lang="en-US" dirty="0"/>
-              <a:t>Otherwise we remove it from the tree</a:t>
+              <a:rPr lang="en-US" dirty="0">
+                <a:solidFill>
+                  <a:schemeClr val="tx1"/>
+                </a:solidFill>
+              </a:rPr>
+              <a:t>Otherwise remove the points from the subtree, and store the distance from the parent to the removed subtree</a:t>
             </a:r>
           </a:p>
         </p:txBody>
@@ -6277,7 +6441,7 @@
 </p:sld>
 </file>
 
-<file path=ppt/slides/slide12.xml><?xml version="1.0" encoding="utf-8"?>
+<file path=ppt/slides/slide13.xml><?xml version="1.0" encoding="utf-8"?>
 <p:sld xmlns:a="http://schemas.openxmlformats.org/drawingml/2006/main" xmlns:r="http://schemas.openxmlformats.org/officeDocument/2006/relationships" xmlns:p="http://schemas.openxmlformats.org/presentationml/2006/main">
   <p:cSld>
     <p:spTree>
@@ -6317,11 +6481,7 @@
           <a:p>
             <a:r>
               <a:rPr lang="en-US" dirty="0"/>
-              <a:t>Extract </a:t>
-            </a:r>
-            <a:r>
-              <a:rPr lang="en-US"/>
-              <a:t>the clusters</a:t>
+              <a:t>Step 5: Extract the clusters</a:t>
             </a:r>
           </a:p>
         </p:txBody>
@@ -6342,19 +6502,416 @@
             <p:ph idx="1"/>
           </p:nvPr>
         </p:nvSpPr>
-        <p:spPr/>
-        <p:txBody>
-          <a:bodyPr/>
-          <a:lstStyle/>
-          <a:p>
-            <a:endParaRPr lang="en-US"/>
-          </a:p>
-        </p:txBody>
-      </p:sp>
+        <p:spPr>
+          <a:xfrm>
+            <a:off x="684212" y="685800"/>
+            <a:ext cx="6506297" cy="4334774"/>
+          </a:xfrm>
+        </p:spPr>
+        <p:txBody>
+          <a:bodyPr>
+            <a:normAutofit fontScale="85000" lnSpcReduction="20000"/>
+          </a:bodyPr>
+          <a:lstStyle/>
+          <a:p>
+            <a:r>
+              <a:rPr lang="en-US" dirty="0">
+                <a:solidFill>
+                  <a:schemeClr val="tx1"/>
+                </a:solidFill>
+              </a:rPr>
+              <a:t>Choose clusters that have the greatest area in the condensed tree</a:t>
+            </a:r>
+          </a:p>
+          <a:p>
+            <a:r>
+              <a:rPr lang="en-US" dirty="0">
+                <a:solidFill>
+                  <a:schemeClr val="tx1"/>
+                </a:solidFill>
+              </a:rPr>
+              <a:t>Constraint: if you select a cluster then you cannot select any descendent cluster</a:t>
+            </a:r>
+          </a:p>
+          <a:p>
+            <a:r>
+              <a:rPr lang="en-US" dirty="0">
+                <a:solidFill>
+                  <a:schemeClr val="tx1"/>
+                </a:solidFill>
+              </a:rPr>
+              <a:t>For each cluster compute the stability:</a:t>
+            </a:r>
+          </a:p>
+          <a:p>
+            <a:pPr lvl="1"/>
+            <a:r>
+              <a:rPr lang="en-US" dirty="0">
+                <a:solidFill>
+                  <a:schemeClr val="tx1"/>
+                </a:solidFill>
+              </a:rPr>
+              <a:t>Inverse of the distance at which the points break away from their parent clusters and form their own cluster, and so on…</a:t>
+            </a:r>
+          </a:p>
+          <a:p>
+            <a:r>
+              <a:rPr lang="en-US" dirty="0">
+                <a:solidFill>
+                  <a:schemeClr val="tx1"/>
+                </a:solidFill>
+              </a:rPr>
+              <a:t>Start from leaf nodes and work up the tree</a:t>
+            </a:r>
+          </a:p>
+          <a:p>
+            <a:r>
+              <a:rPr lang="en-US" dirty="0">
+                <a:solidFill>
+                  <a:schemeClr val="tx1"/>
+                </a:solidFill>
+              </a:rPr>
+              <a:t>If the sum of the stabilities of the child clusters is greater than their parent, then the parent cluster stability is the sum of its children’s</a:t>
+            </a:r>
+          </a:p>
+          <a:p>
+            <a:r>
+              <a:rPr lang="en-US" dirty="0">
+                <a:solidFill>
+                  <a:schemeClr val="tx1"/>
+                </a:solidFill>
+              </a:rPr>
+              <a:t>If the sum of the stabilities of the parent is greater than its children’s, then we declare the parent as a final cluster and disregard its children</a:t>
+            </a:r>
+          </a:p>
+          <a:p>
+            <a:r>
+              <a:rPr lang="en-US" dirty="0">
+                <a:solidFill>
+                  <a:schemeClr val="tx1"/>
+                </a:solidFill>
+              </a:rPr>
+              <a:t>This results in selecting clusters with the “largest area”</a:t>
+            </a:r>
+          </a:p>
+          <a:p>
+            <a:pPr lvl="1"/>
+            <a:endParaRPr lang="en-US" dirty="0">
+              <a:solidFill>
+                <a:schemeClr val="tx1"/>
+              </a:solidFill>
+            </a:endParaRPr>
+          </a:p>
+        </p:txBody>
+      </p:sp>
+      <p:pic>
+        <p:nvPicPr>
+          <p:cNvPr id="4" name="Picture 3">
+            <a:extLst>
+              <a:ext uri="{FF2B5EF4-FFF2-40B4-BE49-F238E27FC236}">
+                <a16:creationId xmlns:a16="http://schemas.microsoft.com/office/drawing/2014/main" id="{3D32CBA8-B41E-47F4-8999-154F72380523}"/>
+              </a:ext>
+            </a:extLst>
+          </p:cNvPr>
+          <p:cNvPicPr>
+            <a:picLocks noChangeAspect="1"/>
+          </p:cNvPicPr>
+          <p:nvPr/>
+        </p:nvPicPr>
+        <p:blipFill rotWithShape="1">
+          <a:blip r:embed="rId2"/>
+          <a:srcRect t="16261" r="1972" b="12969"/>
+          <a:stretch/>
+        </p:blipFill>
+        <p:spPr>
+          <a:xfrm>
+            <a:off x="5141826" y="1762298"/>
+            <a:ext cx="1641362" cy="266007"/>
+          </a:xfrm>
+          <a:prstGeom prst="rect">
+            <a:avLst/>
+          </a:prstGeom>
+        </p:spPr>
+      </p:pic>
+      <p:pic>
+        <p:nvPicPr>
+          <p:cNvPr id="5" name="Picture 4">
+            <a:extLst>
+              <a:ext uri="{FF2B5EF4-FFF2-40B4-BE49-F238E27FC236}">
+                <a16:creationId xmlns:a16="http://schemas.microsoft.com/office/drawing/2014/main" id="{8721382D-C3AA-4A87-9EDC-A8CE0AE06996}"/>
+              </a:ext>
+            </a:extLst>
+          </p:cNvPr>
+          <p:cNvPicPr>
+            <a:picLocks noChangeAspect="1"/>
+          </p:cNvPicPr>
+          <p:nvPr/>
+        </p:nvPicPr>
+        <p:blipFill rotWithShape="1">
+          <a:blip r:embed="rId3"/>
+          <a:srcRect l="1573"/>
+          <a:stretch/>
+        </p:blipFill>
+        <p:spPr>
+          <a:xfrm>
+            <a:off x="7315200" y="1260301"/>
+            <a:ext cx="4577121" cy="3227031"/>
+          </a:xfrm>
+          <a:prstGeom prst="rect">
+            <a:avLst/>
+          </a:prstGeom>
+        </p:spPr>
+      </p:pic>
+      <p:pic>
+        <p:nvPicPr>
+          <p:cNvPr id="6" name="Picture 5">
+            <a:extLst>
+              <a:ext uri="{FF2B5EF4-FFF2-40B4-BE49-F238E27FC236}">
+                <a16:creationId xmlns:a16="http://schemas.microsoft.com/office/drawing/2014/main" id="{DB2D7944-8136-4073-863A-BD5C7153D0C1}"/>
+              </a:ext>
+            </a:extLst>
+          </p:cNvPr>
+          <p:cNvPicPr>
+            <a:picLocks noChangeAspect="1"/>
+          </p:cNvPicPr>
+          <p:nvPr/>
+        </p:nvPicPr>
+        <p:blipFill>
+          <a:blip r:embed="rId4"/>
+          <a:stretch>
+            <a:fillRect/>
+          </a:stretch>
+        </p:blipFill>
+        <p:spPr>
+          <a:xfrm>
+            <a:off x="7273962" y="1260301"/>
+            <a:ext cx="4616774" cy="3227031"/>
+          </a:xfrm>
+          <a:prstGeom prst="rect">
+            <a:avLst/>
+          </a:prstGeom>
+        </p:spPr>
+      </p:pic>
     </p:spTree>
     <p:extLst>
       <p:ext uri="{BB962C8B-B14F-4D97-AF65-F5344CB8AC3E}">
         <p14:creationId xmlns:p14="http://schemas.microsoft.com/office/powerpoint/2010/main" val="4252574023"/>
+      </p:ext>
+    </p:extLst>
+  </p:cSld>
+  <p:clrMapOvr>
+    <a:masterClrMapping/>
+  </p:clrMapOvr>
+  <p:timing>
+    <p:tnLst>
+      <p:par>
+        <p:cTn id="1" dur="indefinite" restart="never" nodeType="tmRoot">
+          <p:childTnLst>
+            <p:seq concurrent="1" nextAc="seek">
+              <p:cTn id="2" dur="indefinite" nodeType="mainSeq">
+                <p:childTnLst>
+                  <p:par>
+                    <p:cTn id="3" fill="hold">
+                      <p:stCondLst>
+                        <p:cond delay="indefinite"/>
+                      </p:stCondLst>
+                      <p:childTnLst>
+                        <p:par>
+                          <p:cTn id="4" fill="hold">
+                            <p:stCondLst>
+                              <p:cond delay="0"/>
+                            </p:stCondLst>
+                            <p:childTnLst>
+                              <p:par>
+                                <p:cTn id="5" presetID="1" presetClass="entr" presetSubtype="0" fill="hold" nodeType="clickEffect">
+                                  <p:stCondLst>
+                                    <p:cond delay="0"/>
+                                  </p:stCondLst>
+                                  <p:childTnLst>
+                                    <p:set>
+                                      <p:cBhvr>
+                                        <p:cTn id="6" dur="1" fill="hold">
+                                          <p:stCondLst>
+                                            <p:cond delay="0"/>
+                                          </p:stCondLst>
+                                        </p:cTn>
+                                        <p:tgtEl>
+                                          <p:spTgt spid="6"/>
+                                        </p:tgtEl>
+                                        <p:attrNameLst>
+                                          <p:attrName>style.visibility</p:attrName>
+                                        </p:attrNameLst>
+                                      </p:cBhvr>
+                                      <p:to>
+                                        <p:strVal val="visible"/>
+                                      </p:to>
+                                    </p:set>
+                                  </p:childTnLst>
+                                </p:cTn>
+                              </p:par>
+                            </p:childTnLst>
+                          </p:cTn>
+                        </p:par>
+                      </p:childTnLst>
+                    </p:cTn>
+                  </p:par>
+                </p:childTnLst>
+              </p:cTn>
+              <p:prevCondLst>
+                <p:cond evt="onPrev" delay="0">
+                  <p:tgtEl>
+                    <p:sldTgt/>
+                  </p:tgtEl>
+                </p:cond>
+              </p:prevCondLst>
+              <p:nextCondLst>
+                <p:cond evt="onNext" delay="0">
+                  <p:tgtEl>
+                    <p:sldTgt/>
+                  </p:tgtEl>
+                </p:cond>
+              </p:nextCondLst>
+            </p:seq>
+          </p:childTnLst>
+        </p:cTn>
+      </p:par>
+    </p:tnLst>
+  </p:timing>
+</p:sld>
+</file>
+
+<file path=ppt/slides/slide14.xml><?xml version="1.0" encoding="utf-8"?>
+<p:sld xmlns:a="http://schemas.openxmlformats.org/drawingml/2006/main" xmlns:r="http://schemas.openxmlformats.org/officeDocument/2006/relationships" xmlns:p="http://schemas.openxmlformats.org/presentationml/2006/main">
+  <p:cSld>
+    <p:spTree>
+      <p:nvGrpSpPr>
+        <p:cNvPr id="1" name=""/>
+        <p:cNvGrpSpPr/>
+        <p:nvPr/>
+      </p:nvGrpSpPr>
+      <p:grpSpPr>
+        <a:xfrm>
+          <a:off x="0" y="0"/>
+          <a:ext cx="0" cy="0"/>
+          <a:chOff x="0" y="0"/>
+          <a:chExt cx="0" cy="0"/>
+        </a:xfrm>
+      </p:grpSpPr>
+      <p:pic>
+        <p:nvPicPr>
+          <p:cNvPr id="5" name="Content Placeholder 4" descr="A screenshot of a social media post&#10;&#10;Description generated with very high confidence">
+            <a:extLst>
+              <a:ext uri="{FF2B5EF4-FFF2-40B4-BE49-F238E27FC236}">
+                <a16:creationId xmlns:a16="http://schemas.microsoft.com/office/drawing/2014/main" id="{77724729-B8C7-4B39-A9F6-5D2FD25D73B9}"/>
+              </a:ext>
+            </a:extLst>
+          </p:cNvPr>
+          <p:cNvPicPr>
+            <a:picLocks noGrp="1" noChangeAspect="1"/>
+          </p:cNvPicPr>
+          <p:nvPr>
+            <p:ph idx="1"/>
+          </p:nvPr>
+        </p:nvPicPr>
+        <p:blipFill rotWithShape="1">
+          <a:blip r:embed="rId2"/>
+          <a:srcRect l="11467" t="8194" r="8876" b="8889"/>
+          <a:stretch/>
+        </p:blipFill>
+        <p:spPr>
+          <a:xfrm>
+            <a:off x="0" y="0"/>
+            <a:ext cx="12192000" cy="6991953"/>
+          </a:xfrm>
+        </p:spPr>
+      </p:pic>
+    </p:spTree>
+    <p:extLst>
+      <p:ext uri="{BB962C8B-B14F-4D97-AF65-F5344CB8AC3E}">
+        <p14:creationId xmlns:p14="http://schemas.microsoft.com/office/powerpoint/2010/main" val="2920768538"/>
+      </p:ext>
+    </p:extLst>
+  </p:cSld>
+  <p:clrMapOvr>
+    <a:masterClrMapping/>
+  </p:clrMapOvr>
+</p:sld>
+</file>
+
+<file path=ppt/slides/slide15.xml><?xml version="1.0" encoding="utf-8"?>
+<p:sld xmlns:a="http://schemas.openxmlformats.org/drawingml/2006/main" xmlns:r="http://schemas.openxmlformats.org/officeDocument/2006/relationships" xmlns:p="http://schemas.openxmlformats.org/presentationml/2006/main">
+  <p:cSld>
+    <p:spTree>
+      <p:nvGrpSpPr>
+        <p:cNvPr id="1" name=""/>
+        <p:cNvGrpSpPr/>
+        <p:nvPr/>
+      </p:nvGrpSpPr>
+      <p:grpSpPr>
+        <a:xfrm>
+          <a:off x="0" y="0"/>
+          <a:ext cx="0" cy="0"/>
+          <a:chOff x="0" y="0"/>
+          <a:chExt cx="0" cy="0"/>
+        </a:xfrm>
+      </p:grpSpPr>
+      <p:sp>
+        <p:nvSpPr>
+          <p:cNvPr id="2" name="Title 1">
+            <a:extLst>
+              <a:ext uri="{FF2B5EF4-FFF2-40B4-BE49-F238E27FC236}">
+                <a16:creationId xmlns:a16="http://schemas.microsoft.com/office/drawing/2014/main" id="{872BD9BD-E348-4449-97DF-9432E551391F}"/>
+              </a:ext>
+            </a:extLst>
+          </p:cNvPr>
+          <p:cNvSpPr>
+            <a:spLocks noGrp="1"/>
+          </p:cNvSpPr>
+          <p:nvPr>
+            <p:ph type="title"/>
+          </p:nvPr>
+        </p:nvSpPr>
+        <p:spPr/>
+        <p:txBody>
+          <a:bodyPr/>
+          <a:lstStyle/>
+          <a:p>
+            <a:endParaRPr lang="en-US"/>
+          </a:p>
+        </p:txBody>
+      </p:sp>
+      <p:pic>
+        <p:nvPicPr>
+          <p:cNvPr id="5" name="Content Placeholder 4" descr="A screenshot of a cell phone&#10;&#10;Description generated with high confidence">
+            <a:extLst>
+              <a:ext uri="{FF2B5EF4-FFF2-40B4-BE49-F238E27FC236}">
+                <a16:creationId xmlns:a16="http://schemas.microsoft.com/office/drawing/2014/main" id="{482045E9-55D2-4D95-8591-6222EC977E5B}"/>
+              </a:ext>
+            </a:extLst>
+          </p:cNvPr>
+          <p:cNvPicPr>
+            <a:picLocks noGrp="1" noChangeAspect="1"/>
+          </p:cNvPicPr>
+          <p:nvPr>
+            <p:ph idx="1"/>
+          </p:nvPr>
+        </p:nvPicPr>
+        <p:blipFill rotWithShape="1">
+          <a:blip r:embed="rId2"/>
+          <a:srcRect l="11150" t="8624" r="8592" b="9278"/>
+          <a:stretch/>
+        </p:blipFill>
+        <p:spPr>
+          <a:xfrm>
+            <a:off x="-116378" y="0"/>
+            <a:ext cx="12486550" cy="6858000"/>
+          </a:xfrm>
+        </p:spPr>
+      </p:pic>
+    </p:spTree>
+    <p:extLst>
+      <p:ext uri="{BB962C8B-B14F-4D97-AF65-F5344CB8AC3E}">
+        <p14:creationId xmlns:p14="http://schemas.microsoft.com/office/powerpoint/2010/main" val="493042920"/>
       </p:ext>
     </p:extLst>
   </p:cSld>
@@ -6454,12 +7011,20 @@
           </a:p>
           <a:p>
             <a:r>
+              <a:rPr lang="en-US">
+                <a:solidFill>
+                  <a:schemeClr val="tx1"/>
+                </a:solidFill>
+              </a:rPr>
+              <a:t>Which features should be </a:t>
+            </a:r>
+            <a:r>
               <a:rPr lang="en-US" dirty="0">
                 <a:solidFill>
                   <a:schemeClr val="tx1"/>
                 </a:solidFill>
               </a:rPr>
-              <a:t>What features should used?</a:t>
+              <a:t>used?</a:t>
             </a:r>
           </a:p>
           <a:p>
@@ -6489,7 +7054,7 @@
                   <a:schemeClr val="tx1"/>
                 </a:solidFill>
               </a:rPr>
-              <a:t>How can clusters are there?</a:t>
+              <a:t>How many clusters are there?</a:t>
             </a:r>
           </a:p>
           <a:p>
@@ -6601,7 +7166,7 @@
           <a:p>
             <a:r>
               <a:rPr lang="en-US" b="1" dirty="0"/>
-              <a:t>Me must consider all of these for our huge and complex datasets</a:t>
+              <a:t>We must consider all of these for our huge and complex datasets</a:t>
             </a:r>
           </a:p>
         </p:txBody>
@@ -6616,6 +7181,112 @@
   <p:clrMapOvr>
     <a:masterClrMapping/>
   </p:clrMapOvr>
+  <p:timing>
+    <p:tnLst>
+      <p:par>
+        <p:cTn id="1" dur="indefinite" restart="never" nodeType="tmRoot">
+          <p:childTnLst>
+            <p:seq concurrent="1" nextAc="seek">
+              <p:cTn id="2" dur="indefinite" nodeType="mainSeq">
+                <p:childTnLst>
+                  <p:par>
+                    <p:cTn id="3" fill="hold">
+                      <p:stCondLst>
+                        <p:cond delay="indefinite"/>
+                      </p:stCondLst>
+                      <p:childTnLst>
+                        <p:par>
+                          <p:cTn id="4" fill="hold">
+                            <p:stCondLst>
+                              <p:cond delay="0"/>
+                            </p:stCondLst>
+                            <p:childTnLst>
+                              <p:par>
+                                <p:cTn id="5" presetID="1" presetClass="entr" presetSubtype="0" fill="hold" grpId="0" nodeType="clickEffect">
+                                  <p:stCondLst>
+                                    <p:cond delay="0"/>
+                                  </p:stCondLst>
+                                  <p:childTnLst>
+                                    <p:set>
+                                      <p:cBhvr>
+                                        <p:cTn id="6" dur="1" fill="hold">
+                                          <p:stCondLst>
+                                            <p:cond delay="0"/>
+                                          </p:stCondLst>
+                                        </p:cTn>
+                                        <p:tgtEl>
+                                          <p:spTgt spid="6"/>
+                                        </p:tgtEl>
+                                        <p:attrNameLst>
+                                          <p:attrName>style.visibility</p:attrName>
+                                        </p:attrNameLst>
+                                      </p:cBhvr>
+                                      <p:to>
+                                        <p:strVal val="visible"/>
+                                      </p:to>
+                                    </p:set>
+                                  </p:childTnLst>
+                                </p:cTn>
+                              </p:par>
+                              <p:par>
+                                <p:cTn id="7" presetID="1" presetClass="entr" presetSubtype="0" fill="hold" grpId="0" nodeType="withEffect">
+                                  <p:stCondLst>
+                                    <p:cond delay="0"/>
+                                  </p:stCondLst>
+                                  <p:childTnLst>
+                                    <p:set>
+                                      <p:cBhvr>
+                                        <p:cTn id="8" dur="1" fill="hold">
+                                          <p:stCondLst>
+                                            <p:cond delay="0"/>
+                                          </p:stCondLst>
+                                        </p:cTn>
+                                        <p:tgtEl>
+                                          <p:spTgt spid="7"/>
+                                        </p:tgtEl>
+                                        <p:attrNameLst>
+                                          <p:attrName>style.visibility</p:attrName>
+                                        </p:attrNameLst>
+                                      </p:cBhvr>
+                                      <p:to>
+                                        <p:strVal val="visible"/>
+                                      </p:to>
+                                    </p:set>
+                                  </p:childTnLst>
+                                </p:cTn>
+                              </p:par>
+                            </p:childTnLst>
+                          </p:cTn>
+                        </p:par>
+                      </p:childTnLst>
+                    </p:cTn>
+                  </p:par>
+                </p:childTnLst>
+              </p:cTn>
+              <p:prevCondLst>
+                <p:cond evt="onPrev" delay="0">
+                  <p:tgtEl>
+                    <p:sldTgt/>
+                  </p:tgtEl>
+                </p:cond>
+              </p:prevCondLst>
+              <p:nextCondLst>
+                <p:cond evt="onNext" delay="0">
+                  <p:tgtEl>
+                    <p:sldTgt/>
+                  </p:tgtEl>
+                </p:cond>
+              </p:nextCondLst>
+            </p:seq>
+          </p:childTnLst>
+        </p:cTn>
+      </p:par>
+    </p:tnLst>
+    <p:bldLst>
+      <p:bldP spid="6" grpId="0" animBg="1"/>
+      <p:bldP spid="7" grpId="0"/>
+    </p:bldLst>
+  </p:timing>
 </p:sld>
 </file>
 
@@ -6680,15 +7351,20 @@
             <p:ph idx="1"/>
           </p:nvPr>
         </p:nvSpPr>
-        <p:spPr/>
+        <p:spPr>
+          <a:xfrm>
+            <a:off x="684212" y="638175"/>
+            <a:ext cx="9698038" cy="4171950"/>
+          </a:xfrm>
+        </p:spPr>
         <p:txBody>
           <a:bodyPr>
-            <a:normAutofit lnSpcReduction="10000"/>
+            <a:noAutofit/>
           </a:bodyPr>
           <a:lstStyle/>
           <a:p>
             <a:r>
-              <a:rPr lang="en-US" dirty="0">
+              <a:rPr lang="en-US" sz="2200" dirty="0">
                 <a:solidFill>
                   <a:schemeClr val="tx1"/>
                 </a:solidFill>
@@ -6696,7 +7372,7 @@
               <a:t>Given  representation of n objects, find k groups based on a </a:t>
             </a:r>
             <a:r>
-              <a:rPr lang="en-US" b="1" dirty="0">
+              <a:rPr lang="en-US" sz="2200" b="1" dirty="0">
                 <a:solidFill>
                   <a:schemeClr val="tx1"/>
                 </a:solidFill>
@@ -6704,7 +7380,7 @@
               <a:t>measure of similarity </a:t>
             </a:r>
             <a:r>
-              <a:rPr lang="en-US" dirty="0" err="1">
+              <a:rPr lang="en-US" sz="2200" dirty="0" err="1">
                 <a:solidFill>
                   <a:schemeClr val="tx1"/>
                 </a:solidFill>
@@ -6712,7 +7388,7 @@
               <a:t>s.t.</a:t>
             </a:r>
             <a:r>
-              <a:rPr lang="en-US" dirty="0">
+              <a:rPr lang="en-US" sz="2200" dirty="0">
                 <a:solidFill>
                   <a:schemeClr val="tx1"/>
                 </a:solidFill>
@@ -6722,7 +7398,7 @@
           </a:p>
           <a:p>
             <a:r>
-              <a:rPr lang="en-US" dirty="0">
+              <a:rPr lang="en-US" sz="2200" dirty="0">
                 <a:solidFill>
                   <a:schemeClr val="tx1"/>
                 </a:solidFill>
@@ -6730,14 +7406,14 @@
               <a:t>Clusters can be defined by </a:t>
             </a:r>
             <a:r>
-              <a:rPr lang="en-US" b="1" dirty="0">
+              <a:rPr lang="en-US" sz="2200" b="1" dirty="0">
                 <a:solidFill>
                   <a:schemeClr val="tx1"/>
                 </a:solidFill>
               </a:rPr>
               <a:t>shape, size, and density</a:t>
             </a:r>
-            <a:endParaRPr lang="en-US" dirty="0">
+            <a:endParaRPr lang="en-US" sz="2200" dirty="0">
               <a:solidFill>
                 <a:schemeClr val="tx1"/>
               </a:solidFill>
@@ -6745,7 +7421,7 @@
           </a:p>
           <a:p>
             <a:r>
-              <a:rPr lang="en-US" dirty="0">
+              <a:rPr lang="en-US" sz="2200" dirty="0">
                 <a:solidFill>
                   <a:schemeClr val="tx1"/>
                 </a:solidFill>
@@ -6755,7 +7431,7 @@
           </a:p>
           <a:p>
             <a:r>
-              <a:rPr lang="en-US" dirty="0">
+              <a:rPr lang="en-US" sz="2200" dirty="0">
                 <a:solidFill>
                   <a:schemeClr val="tx1"/>
                 </a:solidFill>
@@ -6765,7 +7441,7 @@
           </a:p>
           <a:p>
             <a:r>
-              <a:rPr lang="en-US" dirty="0">
+              <a:rPr lang="en-US" sz="2200" dirty="0">
                 <a:solidFill>
                   <a:schemeClr val="tx1"/>
                 </a:solidFill>
@@ -6773,7 +7449,7 @@
               <a:t>Although humans can visually cluster 1-3 dimensions, algorithms are needed for higher dimensional data (</a:t>
             </a:r>
             <a:r>
-              <a:rPr lang="en-US" dirty="0" err="1">
+              <a:rPr lang="en-US" sz="2200" dirty="0" err="1">
                 <a:solidFill>
                   <a:schemeClr val="tx1"/>
                 </a:solidFill>
@@ -6781,7 +7457,7 @@
               <a:t>luteo</a:t>
             </a:r>
             <a:r>
-              <a:rPr lang="en-US" dirty="0">
+              <a:rPr lang="en-US" sz="2200" dirty="0">
                 <a:solidFill>
                   <a:schemeClr val="tx1"/>
                 </a:solidFill>
@@ -6867,29 +7543,29 @@
         </p:nvSpPr>
         <p:spPr>
           <a:xfrm>
-            <a:off x="684212" y="685800"/>
-            <a:ext cx="6897688" cy="3615267"/>
+            <a:off x="684212" y="685801"/>
+            <a:ext cx="6897688" cy="4076700"/>
           </a:xfrm>
         </p:spPr>
         <p:txBody>
           <a:bodyPr>
-            <a:normAutofit/>
+            <a:normAutofit fontScale="92500" lnSpcReduction="10000"/>
           </a:bodyPr>
           <a:lstStyle/>
           <a:p>
             <a:r>
-              <a:rPr lang="en-US" dirty="0">
+              <a:rPr lang="en-US" sz="2400" dirty="0">
                 <a:solidFill>
                   <a:schemeClr val="tx1"/>
                 </a:solidFill>
               </a:rPr>
-              <a:t>Requires 3 parameters; no way of figuring out exactly which values to choose</a:t>
+              <a:t>Requires 3 parameters; no way of figuring out exactly which values to choose for them</a:t>
             </a:r>
           </a:p>
           <a:p>
             <a:pPr lvl="1"/>
             <a:r>
-              <a:rPr lang="en-US" dirty="0">
+              <a:rPr lang="en-US" sz="2000" dirty="0">
                 <a:solidFill>
                   <a:schemeClr val="tx1"/>
                 </a:solidFill>
@@ -6899,7 +7575,7 @@
           </a:p>
           <a:p>
             <a:r>
-              <a:rPr lang="en-US" dirty="0">
+              <a:rPr lang="en-US" sz="2400" dirty="0">
                 <a:solidFill>
                   <a:schemeClr val="tx1"/>
                 </a:solidFill>
@@ -6910,7 +7586,7 @@
           <a:p>
             <a:pPr lvl="1"/>
             <a:r>
-              <a:rPr lang="en-US" dirty="0">
+              <a:rPr lang="en-US" sz="2000" dirty="0">
                 <a:solidFill>
                   <a:schemeClr val="tx1"/>
                 </a:solidFill>
@@ -6920,7 +7596,7 @@
           </a:p>
           <a:p>
             <a:r>
-              <a:rPr lang="en-US" dirty="0">
+              <a:rPr lang="en-US" sz="2400" dirty="0">
                 <a:solidFill>
                   <a:schemeClr val="tx1"/>
                 </a:solidFill>
@@ -6931,17 +7607,17 @@
           <a:p>
             <a:pPr lvl="1"/>
             <a:r>
-              <a:rPr lang="en-US" dirty="0">
+              <a:rPr lang="en-US" sz="2000" dirty="0">
                 <a:solidFill>
                   <a:schemeClr val="tx1"/>
                 </a:solidFill>
               </a:rPr>
-              <a:t>Only spherical cluster regions</a:t>
-            </a:r>
-          </a:p>
-          <a:p>
-            <a:r>
-              <a:rPr lang="en-US" dirty="0">
+              <a:t>Only spherical cluster regions are found</a:t>
+            </a:r>
+          </a:p>
+          <a:p>
+            <a:r>
+              <a:rPr lang="en-US" sz="2400" dirty="0">
                 <a:solidFill>
                   <a:schemeClr val="tx1"/>
                 </a:solidFill>
@@ -7097,18 +7773,18 @@
         </p:nvSpPr>
         <p:spPr>
           <a:xfrm>
-            <a:off x="684212" y="561976"/>
-            <a:ext cx="8534400" cy="4229100"/>
+            <a:off x="684211" y="466725"/>
+            <a:ext cx="11279189" cy="4324351"/>
           </a:xfrm>
         </p:spPr>
         <p:txBody>
           <a:bodyPr>
-            <a:normAutofit fontScale="77500" lnSpcReduction="20000"/>
+            <a:normAutofit fontScale="62500" lnSpcReduction="20000"/>
           </a:bodyPr>
           <a:lstStyle/>
           <a:p>
             <a:r>
-              <a:rPr lang="en-US" dirty="0">
+              <a:rPr lang="en-US" sz="2900" dirty="0">
                 <a:solidFill>
                   <a:schemeClr val="tx1"/>
                 </a:solidFill>
@@ -7118,7 +7794,7 @@
           </a:p>
           <a:p>
             <a:r>
-              <a:rPr lang="en-US" dirty="0">
+              <a:rPr lang="en-US" sz="2900" dirty="0">
                 <a:solidFill>
                   <a:schemeClr val="tx1"/>
                 </a:solidFill>
@@ -7128,7 +7804,7 @@
           </a:p>
           <a:p>
             <a:r>
-              <a:rPr lang="en-US" dirty="0">
+              <a:rPr lang="en-US" sz="2900" dirty="0">
                 <a:solidFill>
                   <a:schemeClr val="tx1"/>
                 </a:solidFill>
@@ -7139,7 +7815,7 @@
           <a:p>
             <a:pPr lvl="1"/>
             <a:r>
-              <a:rPr lang="en-US" dirty="0">
+              <a:rPr lang="en-US" sz="2600" dirty="0">
                 <a:solidFill>
                   <a:schemeClr val="tx1"/>
                 </a:solidFill>
@@ -7150,7 +7826,7 @@
           <a:p>
             <a:pPr lvl="1"/>
             <a:r>
-              <a:rPr lang="en-US" dirty="0">
+              <a:rPr lang="en-US" sz="2600" dirty="0">
                 <a:solidFill>
                   <a:schemeClr val="tx1"/>
                 </a:solidFill>
@@ -7160,18 +7836,7 @@
           </a:p>
           <a:p>
             <a:r>
-              <a:rPr lang="en-US" dirty="0">
-                <a:solidFill>
-                  <a:schemeClr val="tx1"/>
-                </a:solidFill>
-              </a:rPr>
-              <a:t>Classifies data points in three ways</a:t>
-            </a:r>
-          </a:p>
-          <a:p>
-            <a:pPr lvl="1"/>
-            <a:r>
-              <a:rPr lang="en-US" b="1" dirty="0">
+              <a:rPr lang="en-US" sz="2800" b="1" dirty="0">
                 <a:solidFill>
                   <a:schemeClr val="tx1"/>
                 </a:solidFill>
@@ -7179,7 +7844,7 @@
               <a:t>Core point</a:t>
             </a:r>
             <a:r>
-              <a:rPr lang="en-US" dirty="0">
+              <a:rPr lang="en-US" sz="2800" dirty="0">
                 <a:solidFill>
                   <a:schemeClr val="tx1"/>
                 </a:solidFill>
@@ -7188,9 +7853,8 @@
             </a:r>
           </a:p>
           <a:p>
-            <a:pPr lvl="1"/>
-            <a:r>
-              <a:rPr lang="en-US" b="1" dirty="0">
+            <a:r>
+              <a:rPr lang="en-US" sz="2800" b="1" dirty="0">
                 <a:solidFill>
                   <a:schemeClr val="tx1"/>
                 </a:solidFill>
@@ -7198,7 +7862,7 @@
               <a:t>Boundary point</a:t>
             </a:r>
             <a:r>
-              <a:rPr lang="en-US" dirty="0">
+              <a:rPr lang="en-US" sz="2800" dirty="0">
                 <a:solidFill>
                   <a:schemeClr val="tx1"/>
                 </a:solidFill>
@@ -7207,9 +7871,8 @@
             </a:r>
           </a:p>
           <a:p>
-            <a:pPr lvl="1"/>
-            <a:r>
-              <a:rPr lang="en-US" b="1" dirty="0">
+            <a:r>
+              <a:rPr lang="en-US" sz="2800" b="1" dirty="0">
                 <a:solidFill>
                   <a:schemeClr val="tx1"/>
                 </a:solidFill>
@@ -7217,7 +7880,7 @@
               <a:t>Outlier</a:t>
             </a:r>
             <a:r>
-              <a:rPr lang="en-US" dirty="0">
+              <a:rPr lang="en-US" sz="2800" dirty="0">
                 <a:solidFill>
                   <a:schemeClr val="tx1"/>
                 </a:solidFill>
@@ -7227,7 +7890,7 @@
           </a:p>
           <a:p>
             <a:r>
-              <a:rPr lang="en-US" dirty="0">
+              <a:rPr lang="en-US" sz="2900" dirty="0">
                 <a:solidFill>
                   <a:schemeClr val="tx1"/>
                 </a:solidFill>
@@ -7237,18 +7900,7 @@
           </a:p>
           <a:p>
             <a:r>
-              <a:rPr lang="en-US" dirty="0">
-                <a:solidFill>
-                  <a:schemeClr val="tx1"/>
-                </a:solidFill>
-              </a:rPr>
-              <a:t>Limitations</a:t>
-            </a:r>
-          </a:p>
-          <a:p>
-            <a:pPr lvl="1"/>
-            <a:r>
-              <a:rPr lang="en-US" dirty="0">
+              <a:rPr lang="en-US" sz="2800" dirty="0">
                 <a:solidFill>
                   <a:schemeClr val="tx1"/>
                 </a:solidFill>
@@ -7257,18 +7909,14 @@
             </a:r>
           </a:p>
           <a:p>
-            <a:pPr lvl="1"/>
-            <a:r>
-              <a:rPr lang="en-US" dirty="0">
+            <a:r>
+              <a:rPr lang="en-US" sz="2800" dirty="0">
                 <a:solidFill>
                   <a:schemeClr val="tx1"/>
                 </a:solidFill>
               </a:rPr>
               <a:t>Cannot distinguish clusters of varying densities (addressed by HDBSCAN algorithm)</a:t>
             </a:r>
-          </a:p>
-          <a:p>
-            <a:endParaRPr lang="en-US" dirty="0"/>
           </a:p>
         </p:txBody>
       </p:sp>
@@ -7301,7 +7949,7 @@
         </p:blipFill>
         <p:spPr bwMode="auto">
           <a:xfrm>
-            <a:off x="9361487" y="390525"/>
+            <a:off x="9304337" y="466725"/>
             <a:ext cx="2332037" cy="1679067"/>
           </a:xfrm>
           <a:prstGeom prst="rect">
@@ -7532,7 +8180,7 @@
                   <a:schemeClr val="tx1"/>
                 </a:solidFill>
               </a:rPr>
-              <a:t>Only 1 parameter: minimum cluster size</a:t>
+              <a:t>Only 1 input parameter: minimum number of points in a cluster</a:t>
             </a:r>
           </a:p>
           <a:p>
@@ -7988,6 +8636,36 @@
           <a:chExt cx="0" cy="0"/>
         </a:xfrm>
       </p:grpSpPr>
+      <p:pic>
+        <p:nvPicPr>
+          <p:cNvPr id="5" name="Picture 4">
+            <a:extLst>
+              <a:ext uri="{FF2B5EF4-FFF2-40B4-BE49-F238E27FC236}">
+                <a16:creationId xmlns:a16="http://schemas.microsoft.com/office/drawing/2014/main" id="{F35E452E-AA0B-46D7-BB35-CD787B6894CB}"/>
+              </a:ext>
+            </a:extLst>
+          </p:cNvPr>
+          <p:cNvPicPr>
+            <a:picLocks noChangeAspect="1"/>
+          </p:cNvPicPr>
+          <p:nvPr/>
+        </p:nvPicPr>
+        <p:blipFill>
+          <a:blip r:embed="rId2"/>
+          <a:stretch>
+            <a:fillRect/>
+          </a:stretch>
+        </p:blipFill>
+        <p:spPr>
+          <a:xfrm>
+            <a:off x="6361962" y="1001513"/>
+            <a:ext cx="5002502" cy="3485820"/>
+          </a:xfrm>
+          <a:prstGeom prst="rect">
+            <a:avLst/>
+          </a:prstGeom>
+        </p:spPr>
+      </p:pic>
       <p:sp>
         <p:nvSpPr>
           <p:cNvPr id="2" name="Title 1">
@@ -8011,7 +8689,7 @@
           <a:p>
             <a:r>
               <a:rPr lang="en-US" dirty="0"/>
-              <a:t>Build minimum spanning tree</a:t>
+              <a:t>Step 2: Build minimum spanning tree</a:t>
             </a:r>
           </a:p>
         </p:txBody>
@@ -8043,14 +8721,32 @@
           <a:lstStyle/>
           <a:p>
             <a:r>
-              <a:rPr lang="en-US" dirty="0"/>
+              <a:rPr lang="en-US" dirty="0">
+                <a:solidFill>
+                  <a:schemeClr val="tx1"/>
+                </a:solidFill>
+              </a:rPr>
               <a:t>Consider data as a weighted graph with the data points as vertices and MRD as edge weights</a:t>
             </a:r>
           </a:p>
           <a:p>
             <a:r>
-              <a:rPr lang="en-US" dirty="0"/>
+              <a:rPr lang="en-US" dirty="0">
+                <a:solidFill>
+                  <a:schemeClr val="tx1"/>
+                </a:solidFill>
+              </a:rPr>
               <a:t>Find the minimum spanning tree of this graph</a:t>
+            </a:r>
+          </a:p>
+          <a:p>
+            <a:r>
+              <a:rPr lang="en-US" dirty="0">
+                <a:solidFill>
+                  <a:schemeClr val="tx1"/>
+                </a:solidFill>
+              </a:rPr>
+              <a:t>Single-linkage clustering</a:t>
             </a:r>
           </a:p>
         </p:txBody>
@@ -8070,7 +8766,7 @@
           <p:nvPr/>
         </p:nvPicPr>
         <p:blipFill>
-          <a:blip r:embed="rId2"/>
+          <a:blip r:embed="rId3"/>
           <a:stretch>
             <a:fillRect/>
           </a:stretch>
@@ -8095,6 +8791,108 @@
   <p:clrMapOvr>
     <a:masterClrMapping/>
   </p:clrMapOvr>
+  <p:timing>
+    <p:tnLst>
+      <p:par>
+        <p:cTn id="1" dur="indefinite" restart="never" nodeType="tmRoot">
+          <p:childTnLst>
+            <p:seq concurrent="1" nextAc="seek">
+              <p:cTn id="2" dur="indefinite" nodeType="mainSeq">
+                <p:childTnLst>
+                  <p:par>
+                    <p:cTn id="3" fill="hold">
+                      <p:stCondLst>
+                        <p:cond delay="indefinite"/>
+                      </p:stCondLst>
+                      <p:childTnLst>
+                        <p:par>
+                          <p:cTn id="4" fill="hold">
+                            <p:stCondLst>
+                              <p:cond delay="0"/>
+                            </p:stCondLst>
+                            <p:childTnLst>
+                              <p:par>
+                                <p:cTn id="5" presetID="1" presetClass="entr" presetSubtype="0" fill="hold" nodeType="clickEffect">
+                                  <p:stCondLst>
+                                    <p:cond delay="0"/>
+                                  </p:stCondLst>
+                                  <p:childTnLst>
+                                    <p:set>
+                                      <p:cBhvr>
+                                        <p:cTn id="6" dur="1" fill="hold">
+                                          <p:stCondLst>
+                                            <p:cond delay="0"/>
+                                          </p:stCondLst>
+                                        </p:cTn>
+                                        <p:tgtEl>
+                                          <p:spTgt spid="4"/>
+                                        </p:tgtEl>
+                                        <p:attrNameLst>
+                                          <p:attrName>style.visibility</p:attrName>
+                                        </p:attrNameLst>
+                                      </p:cBhvr>
+                                      <p:to>
+                                        <p:strVal val="visible"/>
+                                      </p:to>
+                                    </p:set>
+                                  </p:childTnLst>
+                                </p:cTn>
+                              </p:par>
+                              <p:par>
+                                <p:cTn id="7" presetID="1" presetClass="exit" presetSubtype="0" fill="hold" nodeType="withEffect">
+                                  <p:stCondLst>
+                                    <p:cond delay="0"/>
+                                  </p:stCondLst>
+                                  <p:childTnLst>
+                                    <p:set>
+                                      <p:cBhvr>
+                                        <p:cTn id="8" dur="1" fill="hold">
+                                          <p:stCondLst>
+                                            <p:cond delay="0"/>
+                                          </p:stCondLst>
+                                        </p:cTn>
+                                        <p:tgtEl>
+                                          <p:spTgt spid="5"/>
+                                        </p:tgtEl>
+                                        <p:attrNameLst>
+                                          <p:attrName>style.visibility</p:attrName>
+                                        </p:attrNameLst>
+                                      </p:cBhvr>
+                                      <p:to>
+                                        <p:strVal val="hidden"/>
+                                      </p:to>
+                                    </p:set>
+                                  </p:childTnLst>
+                                </p:cTn>
+                              </p:par>
+                            </p:childTnLst>
+                          </p:cTn>
+                        </p:par>
+                      </p:childTnLst>
+                    </p:cTn>
+                  </p:par>
+                </p:childTnLst>
+              </p:cTn>
+              <p:prevCondLst>
+                <p:cond evt="onPrev" delay="0">
+                  <p:tgtEl>
+                    <p:sldTgt/>
+                  </p:tgtEl>
+                </p:cond>
+              </p:prevCondLst>
+              <p:nextCondLst>
+                <p:cond evt="onNext" delay="0">
+                  <p:tgtEl>
+                    <p:sldTgt/>
+                  </p:tgtEl>
+                </p:cond>
+              </p:nextCondLst>
+            </p:seq>
+          </p:childTnLst>
+        </p:cTn>
+      </p:par>
+    </p:tnLst>
+  </p:timing>
 </p:sld>
 </file>
 

</xml_diff>